<commit_message>
completion of all 20 slides for the presentation
</commit_message>
<xml_diff>
--- a/D3-Library-project.pptx
+++ b/D3-Library-project.pptx
@@ -12,21 +12,21 @@
     <p:sldId id="257" r:id="rId4"/>
     <p:sldId id="270" r:id="rId5"/>
     <p:sldId id="264" r:id="rId6"/>
-    <p:sldId id="267" r:id="rId7"/>
-    <p:sldId id="278" r:id="rId8"/>
+    <p:sldId id="278" r:id="rId7"/>
+    <p:sldId id="267" r:id="rId8"/>
     <p:sldId id="271" r:id="rId9"/>
     <p:sldId id="268" r:id="rId10"/>
     <p:sldId id="277" r:id="rId11"/>
-    <p:sldId id="258" r:id="rId12"/>
-    <p:sldId id="259" r:id="rId13"/>
-    <p:sldId id="260" r:id="rId14"/>
+    <p:sldId id="259" r:id="rId12"/>
+    <p:sldId id="260" r:id="rId13"/>
+    <p:sldId id="279" r:id="rId14"/>
     <p:sldId id="275" r:id="rId15"/>
     <p:sldId id="263" r:id="rId16"/>
     <p:sldId id="274" r:id="rId17"/>
-    <p:sldId id="273" r:id="rId18"/>
-    <p:sldId id="269" r:id="rId19"/>
-    <p:sldId id="272" r:id="rId20"/>
-    <p:sldId id="276" r:id="rId21"/>
+    <p:sldId id="272" r:id="rId18"/>
+    <p:sldId id="280" r:id="rId19"/>
+    <p:sldId id="276" r:id="rId20"/>
+    <p:sldId id="269" r:id="rId21"/>
     <p:sldId id="265" r:id="rId22"/>
   </p:sldIdLst>
   <p:sldSz cx="9144000" cy="6858000" type="screen4x3"/>
@@ -145,426 +145,6 @@
 </p:presentation>
 </file>
 
-<file path=ppt/charts/chart1.xml><?xml version="1.0" encoding="utf-8"?>
-<c:chartSpace xmlns:c="http://schemas.openxmlformats.org/drawingml/2006/chart" xmlns:a="http://schemas.openxmlformats.org/drawingml/2006/main" xmlns:r="http://schemas.openxmlformats.org/officeDocument/2006/relationships" xmlns:c16r2="http://schemas.microsoft.com/office/drawing/2015/06/chart">
-  <c:date1904 val="0"/>
-  <c:lang val="en-US"/>
-  <c:roundedCorners val="0"/>
-  <mc:AlternateContent xmlns:mc="http://schemas.openxmlformats.org/markup-compatibility/2006">
-    <mc:Choice xmlns:c14="http://schemas.microsoft.com/office/drawing/2007/8/2/chart" Requires="c14">
-      <c14:style val="134"/>
-    </mc:Choice>
-    <mc:Fallback>
-      <c:style val="34"/>
-    </mc:Fallback>
-  </mc:AlternateContent>
-  <c:chart>
-    <c:autoTitleDeleted val="0"/>
-    <c:plotArea>
-      <c:layout/>
-      <c:barChart>
-        <c:barDir val="col"/>
-        <c:grouping val="clustered"/>
-        <c:varyColors val="0"/>
-        <c:ser>
-          <c:idx val="0"/>
-          <c:order val="0"/>
-          <c:tx>
-            <c:strRef>
-              <c:f>Sheet1!$B$1</c:f>
-              <c:strCache>
-                <c:ptCount val="1"/>
-                <c:pt idx="0">
-                  <c:v>First</c:v>
-                </c:pt>
-              </c:strCache>
-            </c:strRef>
-          </c:tx>
-          <c:invertIfNegative val="0"/>
-          <c:cat>
-            <c:strRef>
-              <c:f>Sheet1!$A$2:$A$5</c:f>
-              <c:strCache>
-                <c:ptCount val="4"/>
-                <c:pt idx="0">
-                  <c:v>Test 1</c:v>
-                </c:pt>
-                <c:pt idx="1">
-                  <c:v>Test 2</c:v>
-                </c:pt>
-                <c:pt idx="2">
-                  <c:v>Test 3</c:v>
-                </c:pt>
-                <c:pt idx="3">
-                  <c:v>Test 4</c:v>
-                </c:pt>
-              </c:strCache>
-            </c:strRef>
-          </c:cat>
-          <c:val>
-            <c:numRef>
-              <c:f>Sheet1!$B$2:$B$5</c:f>
-              <c:numCache>
-                <c:formatCode>General</c:formatCode>
-                <c:ptCount val="4"/>
-                <c:pt idx="0">
-                  <c:v>20.399999999999999</c:v>
-                </c:pt>
-                <c:pt idx="1">
-                  <c:v>27.4</c:v>
-                </c:pt>
-                <c:pt idx="2">
-                  <c:v>90</c:v>
-                </c:pt>
-                <c:pt idx="3">
-                  <c:v>20.399999999999999</c:v>
-                </c:pt>
-              </c:numCache>
-            </c:numRef>
-          </c:val>
-          <c:extLst>
-            <c:ext xmlns:c16="http://schemas.microsoft.com/office/drawing/2014/chart" uri="{C3380CC4-5D6E-409C-BE32-E72D297353CC}">
-              <c16:uniqueId val="{00000000-54C9-4337-BD0D-F79602CF4DDD}"/>
-            </c:ext>
-          </c:extLst>
-        </c:ser>
-        <c:ser>
-          <c:idx val="1"/>
-          <c:order val="1"/>
-          <c:tx>
-            <c:strRef>
-              <c:f>Sheet1!$C$1</c:f>
-              <c:strCache>
-                <c:ptCount val="1"/>
-                <c:pt idx="0">
-                  <c:v>Second</c:v>
-                </c:pt>
-              </c:strCache>
-            </c:strRef>
-          </c:tx>
-          <c:invertIfNegative val="0"/>
-          <c:cat>
-            <c:strRef>
-              <c:f>Sheet1!$A$2:$A$5</c:f>
-              <c:strCache>
-                <c:ptCount val="4"/>
-                <c:pt idx="0">
-                  <c:v>Test 1</c:v>
-                </c:pt>
-                <c:pt idx="1">
-                  <c:v>Test 2</c:v>
-                </c:pt>
-                <c:pt idx="2">
-                  <c:v>Test 3</c:v>
-                </c:pt>
-                <c:pt idx="3">
-                  <c:v>Test 4</c:v>
-                </c:pt>
-              </c:strCache>
-            </c:strRef>
-          </c:cat>
-          <c:val>
-            <c:numRef>
-              <c:f>Sheet1!$C$2:$C$5</c:f>
-              <c:numCache>
-                <c:formatCode>General</c:formatCode>
-                <c:ptCount val="4"/>
-                <c:pt idx="0">
-                  <c:v>30.6</c:v>
-                </c:pt>
-                <c:pt idx="1">
-                  <c:v>38.6</c:v>
-                </c:pt>
-                <c:pt idx="2">
-                  <c:v>34.6</c:v>
-                </c:pt>
-                <c:pt idx="3">
-                  <c:v>31.6</c:v>
-                </c:pt>
-              </c:numCache>
-            </c:numRef>
-          </c:val>
-          <c:extLst>
-            <c:ext xmlns:c16="http://schemas.microsoft.com/office/drawing/2014/chart" uri="{C3380CC4-5D6E-409C-BE32-E72D297353CC}">
-              <c16:uniqueId val="{00000001-54C9-4337-BD0D-F79602CF4DDD}"/>
-            </c:ext>
-          </c:extLst>
-        </c:ser>
-        <c:ser>
-          <c:idx val="2"/>
-          <c:order val="2"/>
-          <c:tx>
-            <c:strRef>
-              <c:f>Sheet1!$D$1</c:f>
-              <c:strCache>
-                <c:ptCount val="1"/>
-                <c:pt idx="0">
-                  <c:v>Third</c:v>
-                </c:pt>
-              </c:strCache>
-            </c:strRef>
-          </c:tx>
-          <c:invertIfNegative val="0"/>
-          <c:cat>
-            <c:strRef>
-              <c:f>Sheet1!$A$2:$A$5</c:f>
-              <c:strCache>
-                <c:ptCount val="4"/>
-                <c:pt idx="0">
-                  <c:v>Test 1</c:v>
-                </c:pt>
-                <c:pt idx="1">
-                  <c:v>Test 2</c:v>
-                </c:pt>
-                <c:pt idx="2">
-                  <c:v>Test 3</c:v>
-                </c:pt>
-                <c:pt idx="3">
-                  <c:v>Test 4</c:v>
-                </c:pt>
-              </c:strCache>
-            </c:strRef>
-          </c:cat>
-          <c:val>
-            <c:numRef>
-              <c:f>Sheet1!$D$2:$D$5</c:f>
-              <c:numCache>
-                <c:formatCode>General</c:formatCode>
-                <c:ptCount val="4"/>
-                <c:pt idx="0">
-                  <c:v>45.9</c:v>
-                </c:pt>
-                <c:pt idx="1">
-                  <c:v>46.9</c:v>
-                </c:pt>
-                <c:pt idx="2">
-                  <c:v>45</c:v>
-                </c:pt>
-                <c:pt idx="3">
-                  <c:v>43.9</c:v>
-                </c:pt>
-              </c:numCache>
-            </c:numRef>
-          </c:val>
-          <c:extLst>
-            <c:ext xmlns:c16="http://schemas.microsoft.com/office/drawing/2014/chart" uri="{C3380CC4-5D6E-409C-BE32-E72D297353CC}">
-              <c16:uniqueId val="{00000002-54C9-4337-BD0D-F79602CF4DDD}"/>
-            </c:ext>
-          </c:extLst>
-        </c:ser>
-        <c:dLbls>
-          <c:showLegendKey val="0"/>
-          <c:showVal val="0"/>
-          <c:showCatName val="0"/>
-          <c:showSerName val="0"/>
-          <c:showPercent val="0"/>
-          <c:showBubbleSize val="0"/>
-        </c:dLbls>
-        <c:gapWidth val="150"/>
-        <c:axId val="120203136"/>
-        <c:axId val="120204672"/>
-      </c:barChart>
-      <c:catAx>
-        <c:axId val="120203136"/>
-        <c:scaling>
-          <c:orientation val="minMax"/>
-        </c:scaling>
-        <c:delete val="0"/>
-        <c:axPos val="b"/>
-        <c:numFmt formatCode="General" sourceLinked="0"/>
-        <c:majorTickMark val="out"/>
-        <c:minorTickMark val="none"/>
-        <c:tickLblPos val="nextTo"/>
-        <c:crossAx val="120204672"/>
-        <c:crosses val="autoZero"/>
-        <c:auto val="1"/>
-        <c:lblAlgn val="ctr"/>
-        <c:lblOffset val="100"/>
-        <c:noMultiLvlLbl val="0"/>
-      </c:catAx>
-      <c:valAx>
-        <c:axId val="120204672"/>
-        <c:scaling>
-          <c:orientation val="minMax"/>
-        </c:scaling>
-        <c:delete val="0"/>
-        <c:axPos val="l"/>
-        <c:majorGridlines/>
-        <c:numFmt formatCode="General" sourceLinked="1"/>
-        <c:majorTickMark val="out"/>
-        <c:minorTickMark val="none"/>
-        <c:tickLblPos val="nextTo"/>
-        <c:crossAx val="120203136"/>
-        <c:crosses val="autoZero"/>
-        <c:crossBetween val="between"/>
-      </c:valAx>
-    </c:plotArea>
-    <c:legend>
-      <c:legendPos val="r"/>
-      <c:overlay val="0"/>
-    </c:legend>
-    <c:plotVisOnly val="1"/>
-    <c:dispBlanksAs val="gap"/>
-    <c:showDLblsOverMax val="0"/>
-  </c:chart>
-  <c:spPr>
-    <a:ln>
-      <a:noFill/>
-    </a:ln>
-  </c:spPr>
-  <c:txPr>
-    <a:bodyPr/>
-    <a:lstStyle/>
-    <a:p>
-      <a:pPr>
-        <a:defRPr sz="1800"/>
-      </a:pPr>
-      <a:endParaRPr lang="en-US"/>
-    </a:p>
-  </c:txPr>
-  <c:externalData r:id="rId1">
-    <c:autoUpdate val="0"/>
-  </c:externalData>
-</c:chartSpace>
-</file>
-
-<file path=ppt/charts/chart2.xml><?xml version="1.0" encoding="utf-8"?>
-<c:chartSpace xmlns:c="http://schemas.openxmlformats.org/drawingml/2006/chart" xmlns:a="http://schemas.openxmlformats.org/drawingml/2006/main" xmlns:r="http://schemas.openxmlformats.org/officeDocument/2006/relationships" xmlns:c16r2="http://schemas.microsoft.com/office/drawing/2015/06/chart">
-  <c:date1904 val="0"/>
-  <c:lang val="en-US"/>
-  <c:roundedCorners val="0"/>
-  <mc:AlternateContent xmlns:mc="http://schemas.openxmlformats.org/markup-compatibility/2006">
-    <mc:Choice xmlns:c14="http://schemas.microsoft.com/office/drawing/2007/8/2/chart" Requires="c14">
-      <c14:style val="134"/>
-    </mc:Choice>
-    <mc:Fallback>
-      <c:style val="34"/>
-    </mc:Fallback>
-  </mc:AlternateContent>
-  <c:chart>
-    <c:title>
-      <c:overlay val="0"/>
-    </c:title>
-    <c:autoTitleDeleted val="0"/>
-    <c:view3D>
-      <c:rotX val="30"/>
-      <c:rotY val="0"/>
-      <c:rAngAx val="0"/>
-    </c:view3D>
-    <c:floor>
-      <c:thickness val="0"/>
-    </c:floor>
-    <c:sideWall>
-      <c:thickness val="0"/>
-    </c:sideWall>
-    <c:backWall>
-      <c:thickness val="0"/>
-    </c:backWall>
-    <c:plotArea>
-      <c:layout/>
-      <c:pie3DChart>
-        <c:varyColors val="1"/>
-        <c:ser>
-          <c:idx val="0"/>
-          <c:order val="0"/>
-          <c:tx>
-            <c:strRef>
-              <c:f>Sheet1!$B$1</c:f>
-              <c:strCache>
-                <c:ptCount val="1"/>
-                <c:pt idx="0">
-                  <c:v>Project</c:v>
-                </c:pt>
-              </c:strCache>
-            </c:strRef>
-          </c:tx>
-          <c:cat>
-            <c:strRef>
-              <c:f>Sheet1!$A$2:$A$5</c:f>
-              <c:strCache>
-                <c:ptCount val="4"/>
-                <c:pt idx="0">
-                  <c:v>Item 1</c:v>
-                </c:pt>
-                <c:pt idx="1">
-                  <c:v>Item 2</c:v>
-                </c:pt>
-                <c:pt idx="2">
-                  <c:v>Item 3</c:v>
-                </c:pt>
-                <c:pt idx="3">
-                  <c:v>Item 4</c:v>
-                </c:pt>
-              </c:strCache>
-            </c:strRef>
-          </c:cat>
-          <c:val>
-            <c:numRef>
-              <c:f>Sheet1!$B$2:$B$5</c:f>
-              <c:numCache>
-                <c:formatCode>General</c:formatCode>
-                <c:ptCount val="4"/>
-                <c:pt idx="0">
-                  <c:v>8.2000000000000011</c:v>
-                </c:pt>
-                <c:pt idx="1">
-                  <c:v>3.2</c:v>
-                </c:pt>
-                <c:pt idx="2">
-                  <c:v>1.4</c:v>
-                </c:pt>
-                <c:pt idx="3">
-                  <c:v>1.2</c:v>
-                </c:pt>
-              </c:numCache>
-            </c:numRef>
-          </c:val>
-          <c:extLst>
-            <c:ext xmlns:c16="http://schemas.microsoft.com/office/drawing/2014/chart" uri="{C3380CC4-5D6E-409C-BE32-E72D297353CC}">
-              <c16:uniqueId val="{00000000-0C0F-46B5-B10F-79C133D40472}"/>
-            </c:ext>
-          </c:extLst>
-        </c:ser>
-        <c:dLbls>
-          <c:showLegendKey val="0"/>
-          <c:showVal val="0"/>
-          <c:showCatName val="0"/>
-          <c:showSerName val="0"/>
-          <c:showPercent val="0"/>
-          <c:showBubbleSize val="0"/>
-          <c:showLeaderLines val="1"/>
-        </c:dLbls>
-      </c:pie3DChart>
-    </c:plotArea>
-    <c:legend>
-      <c:legendPos val="r"/>
-      <c:overlay val="0"/>
-    </c:legend>
-    <c:plotVisOnly val="1"/>
-    <c:dispBlanksAs val="gap"/>
-    <c:showDLblsOverMax val="0"/>
-  </c:chart>
-  <c:spPr>
-    <a:ln>
-      <a:noFill/>
-    </a:ln>
-  </c:spPr>
-  <c:txPr>
-    <a:bodyPr/>
-    <a:lstStyle/>
-    <a:p>
-      <a:pPr>
-        <a:defRPr sz="1800"/>
-      </a:pPr>
-      <a:endParaRPr lang="en-US"/>
-    </a:p>
-  </c:txPr>
-  <c:externalData r:id="rId1">
-    <c:autoUpdate val="0"/>
-  </c:externalData>
-</c:chartSpace>
-</file>
-
 <file path=ppt/notesMasters/notesMaster1.xml><?xml version="1.0" encoding="utf-8"?>
 <p:notesMaster xmlns:a="http://schemas.openxmlformats.org/drawingml/2006/main" xmlns:r="http://schemas.openxmlformats.org/officeDocument/2006/relationships" xmlns:p="http://schemas.openxmlformats.org/presentationml/2006/main">
   <p:cSld>
@@ -648,7 +228,7 @@
             <a:fld id="{2447E72A-D913-4DC2-9E0A-E520CE8FCC86}" type="datetimeFigureOut">
               <a:rPr lang="en-US" smtClean="0"/>
               <a:pPr/>
-              <a:t>12/1/2016</a:t>
+              <a:t>12/3/2016</a:t>
             </a:fld>
             <a:endParaRPr lang="en-US"/>
           </a:p>
@@ -1043,96 +623,6 @@
           <a:p>
             <a:r>
               <a:rPr lang="en-US" dirty="0"/>
-              <a:t>Conclusion to course,</a:t>
-            </a:r>
-            <a:r>
-              <a:rPr lang="en-US" baseline="0" dirty="0"/>
-              <a:t> lecture, et al. </a:t>
-            </a:r>
-            <a:endParaRPr lang="en-US" dirty="0"/>
-          </a:p>
-        </p:txBody>
-      </p:sp>
-      <p:sp>
-        <p:nvSpPr>
-          <p:cNvPr id="4" name="Slide Number Placeholder 3"/>
-          <p:cNvSpPr>
-            <a:spLocks noGrp="1"/>
-          </p:cNvSpPr>
-          <p:nvPr>
-            <p:ph type="sldNum" sz="quarter" idx="10"/>
-          </p:nvPr>
-        </p:nvSpPr>
-        <p:spPr/>
-        <p:txBody>
-          <a:bodyPr/>
-          <a:lstStyle/>
-          <a:p>
-            <a:fld id="{A5D78FC6-CE17-4259-A63C-DDFC12E048FC}" type="slidenum">
-              <a:rPr lang="en-US" smtClean="0"/>
-              <a:pPr/>
-              <a:t>17</a:t>
-            </a:fld>
-            <a:endParaRPr lang="en-US"/>
-          </a:p>
-        </p:txBody>
-      </p:sp>
-    </p:spTree>
-  </p:cSld>
-  <p:clrMapOvr>
-    <a:masterClrMapping/>
-  </p:clrMapOvr>
-</p:notes>
-</file>
-
-<file path=ppt/notesSlides/notesSlide11.xml><?xml version="1.0" encoding="utf-8"?>
-<p:notes xmlns:a="http://schemas.openxmlformats.org/drawingml/2006/main" xmlns:r="http://schemas.openxmlformats.org/officeDocument/2006/relationships" xmlns:p="http://schemas.openxmlformats.org/presentationml/2006/main">
-  <p:cSld>
-    <p:spTree>
-      <p:nvGrpSpPr>
-        <p:cNvPr id="1" name=""/>
-        <p:cNvGrpSpPr/>
-        <p:nvPr/>
-      </p:nvGrpSpPr>
-      <p:grpSpPr>
-        <a:xfrm>
-          <a:off x="0" y="0"/>
-          <a:ext cx="0" cy="0"/>
-          <a:chOff x="0" y="0"/>
-          <a:chExt cx="0" cy="0"/>
-        </a:xfrm>
-      </p:grpSpPr>
-      <p:sp>
-        <p:nvSpPr>
-          <p:cNvPr id="2" name="Slide Image Placeholder 1"/>
-          <p:cNvSpPr>
-            <a:spLocks noGrp="1" noRot="1" noChangeAspect="1"/>
-          </p:cNvSpPr>
-          <p:nvPr>
-            <p:ph type="sldImg"/>
-          </p:nvPr>
-        </p:nvSpPr>
-        <p:spPr/>
-      </p:sp>
-      <p:sp>
-        <p:nvSpPr>
-          <p:cNvPr id="3" name="Notes Placeholder 2"/>
-          <p:cNvSpPr>
-            <a:spLocks noGrp="1"/>
-          </p:cNvSpPr>
-          <p:nvPr>
-            <p:ph type="body" idx="1"/>
-          </p:nvPr>
-        </p:nvSpPr>
-        <p:spPr/>
-        <p:txBody>
-          <a:bodyPr>
-            <a:normAutofit/>
-          </a:bodyPr>
-          <a:lstStyle/>
-          <a:p>
-            <a:r>
-              <a:rPr lang="en-US" dirty="0"/>
               <a:t>An</a:t>
             </a:r>
             <a:r>
@@ -1434,7 +924,7 @@
             <a:fld id="{A5D78FC6-CE17-4259-A63C-DDFC12E048FC}" type="slidenum">
               <a:rPr lang="en-US" smtClean="0"/>
               <a:pPr/>
-              <a:t>5</a:t>
+              <a:t>6</a:t>
             </a:fld>
             <a:endParaRPr lang="en-US"/>
           </a:p>
@@ -1586,11 +1076,11 @@
           <a:p>
             <a:r>
               <a:rPr lang="en-US" dirty="0"/>
-              <a:t>Relative </a:t>
+              <a:t>A list of procedures and steps,</a:t>
             </a:r>
             <a:r>
               <a:rPr lang="en-US" baseline="0" dirty="0"/>
-              <a:t>vocabulary list. </a:t>
+              <a:t> or a lecture slide with media.</a:t>
             </a:r>
             <a:endParaRPr lang="en-US" dirty="0"/>
           </a:p>
@@ -1676,13 +1166,8 @@
           <a:p>
             <a:r>
               <a:rPr lang="en-US" dirty="0"/>
-              <a:t>A list of procedures and steps,</a:t>
-            </a:r>
-            <a:r>
-              <a:rPr lang="en-US" baseline="0" dirty="0"/>
-              <a:t> or a lecture slide with media.</a:t>
-            </a:r>
-            <a:endParaRPr lang="en-US" dirty="0"/>
+              <a:t>Example graph/chart.</a:t>
+            </a:r>
           </a:p>
         </p:txBody>
       </p:sp>
@@ -1764,10 +1249,30 @@
           </a:bodyPr>
           <a:lstStyle/>
           <a:p>
+            <a:pPr marL="0" marR="0" indent="0" algn="l" defTabSz="914400" rtl="0" eaLnBrk="1" fontAlgn="auto" latinLnBrk="0" hangingPunct="1">
+              <a:lnSpc>
+                <a:spcPct val="100000"/>
+              </a:lnSpc>
+              <a:spcBef>
+                <a:spcPts val="0"/>
+              </a:spcBef>
+              <a:spcAft>
+                <a:spcPts val="0"/>
+              </a:spcAft>
+              <a:buClrTx/>
+              <a:buSzTx/>
+              <a:buFontTx/>
+              <a:buNone/>
+              <a:tabLst/>
+              <a:defRPr/>
+            </a:pPr>
             <a:r>
               <a:rPr lang="en-US" dirty="0"/>
               <a:t>Example graph/chart.</a:t>
             </a:r>
+          </a:p>
+          <a:p>
+            <a:endParaRPr lang="en-US" dirty="0"/>
           </a:p>
         </p:txBody>
       </p:sp>
@@ -1789,7 +1294,7 @@
             <a:fld id="{A5D78FC6-CE17-4259-A63C-DDFC12E048FC}" type="slidenum">
               <a:rPr lang="en-US" smtClean="0"/>
               <a:pPr/>
-              <a:t>12</a:t>
+              <a:t>14</a:t>
             </a:fld>
             <a:endParaRPr lang="en-US"/>
           </a:p>
@@ -1849,29 +1354,14 @@
           </a:bodyPr>
           <a:lstStyle/>
           <a:p>
-            <a:pPr marL="0" marR="0" indent="0" algn="l" defTabSz="914400" rtl="0" eaLnBrk="1" fontAlgn="auto" latinLnBrk="0" hangingPunct="1">
-              <a:lnSpc>
-                <a:spcPct val="100000"/>
-              </a:lnSpc>
-              <a:spcBef>
-                <a:spcPts val="0"/>
-              </a:spcBef>
-              <a:spcAft>
-                <a:spcPts val="0"/>
-              </a:spcAft>
-              <a:buClrTx/>
-              <a:buSzTx/>
-              <a:buFontTx/>
-              <a:buNone/>
-              <a:tabLst/>
-              <a:defRPr/>
-            </a:pPr>
-            <a:r>
-              <a:rPr lang="en-US" dirty="0"/>
-              <a:t>Example graph/chart.</a:t>
-            </a:r>
-          </a:p>
-          <a:p>
+            <a:r>
+              <a:rPr lang="en-US" dirty="0"/>
+              <a:t>Conclusion to course,</a:t>
+            </a:r>
+            <a:r>
+              <a:rPr lang="en-US" baseline="0" dirty="0"/>
+              <a:t> lecture, et al. </a:t>
+            </a:r>
             <a:endParaRPr lang="en-US" dirty="0"/>
           </a:p>
         </p:txBody>
@@ -1894,7 +1384,7 @@
             <a:fld id="{A5D78FC6-CE17-4259-A63C-DDFC12E048FC}" type="slidenum">
               <a:rPr lang="en-US" smtClean="0"/>
               <a:pPr/>
-              <a:t>14</a:t>
+              <a:t>19</a:t>
             </a:fld>
             <a:endParaRPr lang="en-US"/>
           </a:p>
@@ -2210,7 +1700,7 @@
             <a:fld id="{743653DA-8BF4-4869-96FE-9BCF43372D46}" type="datetime8">
               <a:rPr lang="en-US" smtClean="0"/>
               <a:pPr algn="ctr"/>
-              <a:t>12/1/2016 10:01 PM</a:t>
+              <a:t>12/3/2016 12:46 AM</a:t>
             </a:fld>
             <a:endParaRPr lang="en-US" sz="2000" dirty="0">
               <a:solidFill>
@@ -2418,7 +1908,7 @@
                 </a:solidFill>
               </a:rPr>
               <a:pPr/>
-              <a:t>12/1/2016 10:01 PM</a:t>
+              <a:t>12/3/2016 12:46 AM</a:t>
             </a:fld>
             <a:endParaRPr lang="en-US"/>
           </a:p>
@@ -2608,7 +2098,7 @@
                 </a:solidFill>
               </a:rPr>
               <a:pPr/>
-              <a:t>12/1/2016 10:01 PM</a:t>
+              <a:t>12/3/2016 12:46 AM</a:t>
             </a:fld>
             <a:endParaRPr lang="en-US" dirty="0"/>
           </a:p>
@@ -2877,7 +2367,7 @@
             <a:fld id="{B7129108-AC8D-4212-9283-60D9E99BF07A}" type="datetime8">
               <a:rPr lang="en-US" smtClean="0"/>
               <a:pPr/>
-              <a:t>12/1/2016 10:01 PM</a:t>
+              <a:t>12/3/2016 12:46 AM</a:t>
             </a:fld>
             <a:endParaRPr lang="en-US" dirty="0"/>
           </a:p>
@@ -3294,7 +2784,7 @@
             <a:fld id="{B6DED3D3-6235-4F4C-B439-DF277FB555A7}" type="datetime8">
               <a:rPr lang="en-US" smtClean="0"/>
               <a:pPr/>
-              <a:t>12/1/2016 10:01 PM</a:t>
+              <a:t>12/3/2016 12:46 AM</a:t>
             </a:fld>
             <a:endParaRPr lang="en-US"/>
           </a:p>
@@ -3542,7 +3032,7 @@
             <a:fld id="{3B5F1E3E-4B2F-4895-B65E-28B2E64F39F6}" type="datetime8">
               <a:rPr lang="en-US" smtClean="0"/>
               <a:pPr/>
-              <a:t>12/1/2016 10:01 PM</a:t>
+              <a:t>12/3/2016 12:46 AM</a:t>
             </a:fld>
             <a:endParaRPr lang="en-US"/>
           </a:p>
@@ -3781,7 +3271,7 @@
             <a:fld id="{63085435-8225-4333-BFFA-0096413F0D76}" type="datetime8">
               <a:rPr lang="en-US" smtClean="0"/>
               <a:pPr/>
-              <a:t>12/1/2016 10:01 PM</a:t>
+              <a:t>12/3/2016 12:46 AM</a:t>
             </a:fld>
             <a:endParaRPr lang="en-US"/>
           </a:p>
@@ -3978,7 +3468,7 @@
             <a:fld id="{0783C494-2A87-468C-A21B-CB14FB9ABB00}" type="datetime8">
               <a:rPr lang="en-US" smtClean="0"/>
               <a:pPr/>
-              <a:t>12/1/2016 10:01 PM</a:t>
+              <a:t>12/3/2016 12:46 AM</a:t>
             </a:fld>
             <a:endParaRPr lang="en-US"/>
           </a:p>
@@ -4082,7 +3572,7 @@
             <a:fld id="{9A180FA0-5B31-4864-A2BB-719EA5A679C6}" type="datetime8">
               <a:rPr lang="en-US" smtClean="0"/>
               <a:pPr/>
-              <a:t>12/1/2016 10:01 PM</a:t>
+              <a:t>12/3/2016 12:46 AM</a:t>
             </a:fld>
             <a:endParaRPr lang="en-US"/>
           </a:p>
@@ -4224,7 +3714,7 @@
             <a:fld id="{4BECC0C8-36B8-442A-833D-B6AACE86BB77}" type="datetime8">
               <a:rPr lang="en-US" smtClean="0"/>
               <a:pPr/>
-              <a:t>12/1/2016 10:01 PM</a:t>
+              <a:t>12/3/2016 12:46 AM</a:t>
             </a:fld>
             <a:endParaRPr lang="en-US"/>
           </a:p>
@@ -4699,7 +4189,7 @@
             <a:fld id="{51E20EC5-AC53-4169-941E-EDF10CD23748}" type="datetime8">
               <a:rPr lang="en-US" smtClean="0"/>
               <a:pPr/>
-              <a:t>12/1/2016 10:01 PM</a:t>
+              <a:t>12/3/2016 12:46 AM</a:t>
             </a:fld>
             <a:endParaRPr lang="en-US"/>
           </a:p>
@@ -4967,7 +4457,7 @@
                 </a:solidFill>
               </a:rPr>
               <a:pPr/>
-              <a:t>12/1/2016 10:01 PM</a:t>
+              <a:t>12/3/2016 12:46 AM</a:t>
             </a:fld>
             <a:endParaRPr lang="en-US" sz="1400" dirty="0">
               <a:solidFill>
@@ -5635,11 +5125,11 @@
   <p:clrMapOvr>
     <a:masterClrMapping/>
   </p:clrMapOvr>
-  <mc:AlternateContent xmlns:mc="http://schemas.openxmlformats.org/markup-compatibility/2006">
-    <mc:Choice xmlns:p14="http://schemas.microsoft.com/office/powerpoint/2010/main" Requires="p14">
+  <mc:AlternateContent xmlns:mc="http://schemas.openxmlformats.org/markup-compatibility/2006" xmlns:p14="http://schemas.microsoft.com/office/powerpoint/2010/main">
+    <mc:Choice Requires="p14">
       <p:transition spd="slow" p14:dur="2000" advTm="15000"/>
     </mc:Choice>
-    <mc:Fallback>
+    <mc:Fallback xmlns="">
       <p:transition spd="slow" advTm="15000"/>
     </mc:Fallback>
   </mc:AlternateContent>
@@ -5680,7 +5170,7 @@
           <a:p>
             <a:r>
               <a:rPr lang="en-US" dirty="0"/>
-              <a:t>Vocabulary</a:t>
+              <a:t>  D3 Graphing – Part 2</a:t>
             </a:r>
           </a:p>
         </p:txBody>
@@ -5706,27 +5196,15 @@
             </a:pPr>
             <a:r>
               <a:rPr lang="en-US" dirty="0"/>
-              <a:t>Term One</a:t>
-            </a:r>
-          </a:p>
-          <a:p>
-            <a:pPr lvl="1">
-              <a:buFont typeface="Wingdings" pitchFamily="2" charset="2"/>
-              <a:buChar char="Ø"/>
-            </a:pPr>
-            <a:r>
-              <a:rPr lang="en-US" dirty="0"/>
-              <a:t>Definition A</a:t>
-            </a:r>
-          </a:p>
-          <a:p>
-            <a:pPr lvl="1">
-              <a:buFont typeface="Wingdings" pitchFamily="2" charset="2"/>
-              <a:buChar char="Ø"/>
-            </a:pPr>
-            <a:r>
-              <a:rPr lang="en-US" dirty="0"/>
-              <a:t>Definition B</a:t>
+              <a:t>Gather the data from the </a:t>
+            </a:r>
+            <a:r>
+              <a:rPr lang="en-US" dirty="0" err="1"/>
+              <a:t>json</a:t>
+            </a:r>
+            <a:r>
+              <a:rPr lang="en-US" dirty="0"/>
+              <a:t> data file</a:t>
             </a:r>
           </a:p>
           <a:p>
@@ -5736,17 +5214,7 @@
             </a:pPr>
             <a:r>
               <a:rPr lang="en-US" dirty="0"/>
-              <a:t>Term Two</a:t>
-            </a:r>
-          </a:p>
-          <a:p>
-            <a:pPr lvl="1">
-              <a:buFont typeface="Wingdings" pitchFamily="2" charset="2"/>
-              <a:buChar char="Ø"/>
-            </a:pPr>
-            <a:r>
-              <a:rPr lang="en-US" dirty="0"/>
-              <a:t>Definition</a:t>
+              <a:t>Map the domain to the data</a:t>
             </a:r>
           </a:p>
           <a:p>
@@ -5756,97 +5224,9 @@
             </a:pPr>
             <a:r>
               <a:rPr lang="en-US" dirty="0"/>
-              <a:t>Term Three</a:t>
-            </a:r>
-          </a:p>
-          <a:p>
-            <a:pPr lvl="1">
-              <a:buFont typeface="Wingdings" pitchFamily="2" charset="2"/>
-              <a:buChar char="Ø"/>
-            </a:pPr>
-            <a:r>
-              <a:rPr lang="en-US" dirty="0"/>
-              <a:t>Definition</a:t>
-            </a:r>
-          </a:p>
-          <a:p>
-            <a:pPr lvl="1">
-              <a:buFont typeface="Wingdings" pitchFamily="2" charset="2"/>
-              <a:buChar char="Ø"/>
-            </a:pPr>
-            <a:endParaRPr lang="en-US" dirty="0"/>
-          </a:p>
-        </p:txBody>
-      </p:sp>
-    </p:spTree>
-  </p:cSld>
-  <p:clrMapOvr>
-    <a:masterClrMapping/>
-  </p:clrMapOvr>
-  <mc:AlternateContent xmlns:mc="http://schemas.openxmlformats.org/markup-compatibility/2006">
-    <mc:Choice xmlns:p14="http://schemas.microsoft.com/office/powerpoint/2010/main" Requires="p14">
-      <p:transition spd="slow" p14:dur="2000" advTm="15000"/>
-    </mc:Choice>
-    <mc:Fallback>
-      <p:transition spd="slow" advTm="15000"/>
-    </mc:Fallback>
-  </mc:AlternateContent>
-</p:sld>
-</file>
-
-<file path=ppt/slides/slide11.xml><?xml version="1.0" encoding="utf-8"?>
-<p:sld xmlns:a="http://schemas.openxmlformats.org/drawingml/2006/main" xmlns:r="http://schemas.openxmlformats.org/officeDocument/2006/relationships" xmlns:p="http://schemas.openxmlformats.org/presentationml/2006/main">
-  <p:cSld>
-    <p:spTree>
-      <p:nvGrpSpPr>
-        <p:cNvPr id="1" name=""/>
-        <p:cNvGrpSpPr/>
-        <p:nvPr/>
-      </p:nvGrpSpPr>
-      <p:grpSpPr>
-        <a:xfrm>
-          <a:off x="0" y="0"/>
-          <a:ext cx="0" cy="0"/>
-          <a:chOff x="0" y="0"/>
-          <a:chExt cx="0" cy="0"/>
-        </a:xfrm>
-      </p:grpSpPr>
-      <p:sp>
-        <p:nvSpPr>
-          <p:cNvPr id="2" name="Rectangle 1"/>
-          <p:cNvSpPr>
-            <a:spLocks noGrp="1"/>
-          </p:cNvSpPr>
-          <p:nvPr>
-            <p:ph type="title"/>
-          </p:nvPr>
-        </p:nvSpPr>
-        <p:spPr/>
-        <p:txBody>
-          <a:bodyPr/>
-          <a:lstStyle/>
-          <a:p>
-            <a:r>
-              <a:rPr lang="en-US" dirty="0"/>
-              <a:t>Procedures/Lecture Slide</a:t>
-            </a:r>
-          </a:p>
-        </p:txBody>
-      </p:sp>
-      <p:sp>
-        <p:nvSpPr>
-          <p:cNvPr id="3" name="Rectangle 2"/>
-          <p:cNvSpPr>
-            <a:spLocks noGrp="1"/>
-          </p:cNvSpPr>
-          <p:nvPr>
-            <p:ph sz="quarter" idx="1"/>
-          </p:nvPr>
-        </p:nvSpPr>
-        <p:spPr/>
-        <p:txBody>
-          <a:bodyPr/>
-          <a:lstStyle/>
+              <a:t>Plot the data</a:t>
+            </a:r>
+          </a:p>
           <a:p>
             <a:pPr>
               <a:buFont typeface="Wingdings" pitchFamily="2" charset="2"/>
@@ -5854,27 +5234,17 @@
             </a:pPr>
             <a:r>
               <a:rPr lang="en-US" dirty="0"/>
-              <a:t>Add procedure here</a:t>
-            </a:r>
-          </a:p>
-          <a:p>
-            <a:pPr lvl="1">
+              <a:t>Add the x axis</a:t>
+            </a:r>
+          </a:p>
+          <a:p>
+            <a:pPr>
               <a:buFont typeface="Wingdings" pitchFamily="2" charset="2"/>
               <a:buChar char="Ø"/>
             </a:pPr>
             <a:r>
               <a:rPr lang="en-US" dirty="0"/>
-              <a:t>Step one</a:t>
-            </a:r>
-          </a:p>
-          <a:p>
-            <a:pPr lvl="1">
-              <a:buFont typeface="Wingdings" pitchFamily="2" charset="2"/>
-              <a:buChar char="Ø"/>
-            </a:pPr>
-            <a:r>
-              <a:rPr lang="en-US" dirty="0"/>
-              <a:t>Step two</a:t>
+              <a:t>Add the values to the bars</a:t>
             </a:r>
           </a:p>
         </p:txBody>
@@ -5914,11 +5284,92 @@
   <p:clrMapOvr>
     <a:masterClrMapping/>
   </p:clrMapOvr>
-  <mc:AlternateContent xmlns:mc="http://schemas.openxmlformats.org/markup-compatibility/2006">
-    <mc:Choice xmlns:p14="http://schemas.microsoft.com/office/powerpoint/2010/main" Requires="p14">
+  <mc:AlternateContent xmlns:mc="http://schemas.openxmlformats.org/markup-compatibility/2006" xmlns:p14="http://schemas.microsoft.com/office/powerpoint/2010/main">
+    <mc:Choice Requires="p14">
       <p:transition spd="slow" p14:dur="2000" advTm="15000"/>
     </mc:Choice>
-    <mc:Fallback>
+    <mc:Fallback xmlns="">
+      <p:transition spd="slow" advTm="15000"/>
+    </mc:Fallback>
+  </mc:AlternateContent>
+</p:sld>
+</file>
+
+<file path=ppt/slides/slide11.xml><?xml version="1.0" encoding="utf-8"?>
+<p:sld xmlns:a="http://schemas.openxmlformats.org/drawingml/2006/main" xmlns:r="http://schemas.openxmlformats.org/officeDocument/2006/relationships" xmlns:p="http://schemas.openxmlformats.org/presentationml/2006/main">
+  <p:cSld>
+    <p:spTree>
+      <p:nvGrpSpPr>
+        <p:cNvPr id="1" name=""/>
+        <p:cNvGrpSpPr/>
+        <p:nvPr/>
+      </p:nvGrpSpPr>
+      <p:grpSpPr>
+        <a:xfrm>
+          <a:off x="0" y="0"/>
+          <a:ext cx="0" cy="0"/>
+          <a:chOff x="0" y="0"/>
+          <a:chExt cx="0" cy="0"/>
+        </a:xfrm>
+      </p:grpSpPr>
+      <p:sp>
+        <p:nvSpPr>
+          <p:cNvPr id="2" name="Rectangle 1"/>
+          <p:cNvSpPr>
+            <a:spLocks noGrp="1"/>
+          </p:cNvSpPr>
+          <p:nvPr>
+            <p:ph type="title"/>
+          </p:nvPr>
+        </p:nvSpPr>
+        <p:spPr/>
+        <p:txBody>
+          <a:bodyPr/>
+          <a:lstStyle/>
+          <a:p>
+            <a:r>
+              <a:rPr lang="en-US" dirty="0"/>
+              <a:t>  D3 Chart of Tablets Sold</a:t>
+            </a:r>
+          </a:p>
+        </p:txBody>
+      </p:sp>
+      <p:pic>
+        <p:nvPicPr>
+          <p:cNvPr id="5" name="Content Placeholder 4"/>
+          <p:cNvPicPr>
+            <a:picLocks noGrp="1" noChangeAspect="1"/>
+          </p:cNvPicPr>
+          <p:nvPr>
+            <p:ph sz="quarter" idx="1"/>
+          </p:nvPr>
+        </p:nvPicPr>
+        <p:blipFill>
+          <a:blip r:embed="rId3"/>
+          <a:stretch>
+            <a:fillRect/>
+          </a:stretch>
+        </p:blipFill>
+        <p:spPr>
+          <a:xfrm>
+            <a:off x="612775" y="1709912"/>
+            <a:ext cx="8153400" cy="4276375"/>
+          </a:xfrm>
+          <a:prstGeom prst="rect">
+            <a:avLst/>
+          </a:prstGeom>
+        </p:spPr>
+      </p:pic>
+    </p:spTree>
+  </p:cSld>
+  <p:clrMapOvr>
+    <a:masterClrMapping/>
+  </p:clrMapOvr>
+  <mc:AlternateContent xmlns:mc="http://schemas.openxmlformats.org/markup-compatibility/2006" xmlns:p14="http://schemas.microsoft.com/office/powerpoint/2010/main">
+    <mc:Choice Requires="p14">
+      <p:transition spd="slow" p14:dur="2000" advTm="15000"/>
+    </mc:Choice>
+    <mc:Fallback xmlns="">
       <p:transition spd="slow" advTm="15000"/>
     </mc:Fallback>
   </mc:AlternateContent>
@@ -5944,7 +5395,7 @@
       </p:grpSpPr>
       <p:sp>
         <p:nvSpPr>
-          <p:cNvPr id="2" name="Rectangle 1"/>
+          <p:cNvPr id="2" name="Title 1"/>
           <p:cNvSpPr>
             <a:spLocks noGrp="1"/>
           </p:cNvSpPr>
@@ -5959,49 +5410,83 @@
           <a:p>
             <a:r>
               <a:rPr lang="en-US" dirty="0"/>
-              <a:t>Graphs/Charts 1</a:t>
-            </a:r>
-          </a:p>
-        </p:txBody>
-      </p:sp>
-      <p:graphicFrame>
-        <p:nvGraphicFramePr>
-          <p:cNvPr id="4" name="Content Placeholder 3"/>
-          <p:cNvGraphicFramePr>
-            <a:graphicFrameLocks noGrp="1"/>
-          </p:cNvGraphicFramePr>
+              <a:t>  D3 - Examples</a:t>
+            </a:r>
+          </a:p>
+        </p:txBody>
+      </p:sp>
+      <p:pic>
+        <p:nvPicPr>
+          <p:cNvPr id="5" name="Content Placeholder 4"/>
+          <p:cNvPicPr>
+            <a:picLocks noGrp="1" noChangeAspect="1"/>
+          </p:cNvPicPr>
           <p:nvPr>
             <p:ph sz="quarter" idx="1"/>
-            <p:extLst>
-              <p:ext uri="{D42A27DB-BD31-4B8C-83A1-F6EECF244321}">
-                <p14:modId xmlns:p14="http://schemas.microsoft.com/office/powerpoint/2010/main" val="918522204"/>
-              </p:ext>
-            </p:extLst>
-          </p:nvPr>
-        </p:nvGraphicFramePr>
-        <p:xfrm>
-          <a:off x="612775" y="1600200"/>
-          <a:ext cx="7693025" cy="4495800"/>
-        </p:xfrm>
-        <a:graphic>
-          <a:graphicData uri="http://schemas.openxmlformats.org/drawingml/2006/chart">
-            <c:chart xmlns:c="http://schemas.openxmlformats.org/drawingml/2006/chart" xmlns:r="http://schemas.openxmlformats.org/officeDocument/2006/relationships" r:id="rId3"/>
-          </a:graphicData>
-        </a:graphic>
-      </p:graphicFrame>
+          </p:nvPr>
+        </p:nvPicPr>
+        <p:blipFill>
+          <a:blip r:embed="rId2">
+            <a:extLst>
+              <a:ext uri="{28A0092B-C50C-407E-A947-70E740481C1C}">
+                <a14:useLocalDpi xmlns:a14="http://schemas.microsoft.com/office/drawing/2010/main" val="0"/>
+              </a:ext>
+            </a:extLst>
+          </a:blip>
+          <a:stretch>
+            <a:fillRect/>
+          </a:stretch>
+        </p:blipFill>
+        <p:spPr>
+          <a:xfrm>
+            <a:off x="876300" y="1981200"/>
+            <a:ext cx="3810000" cy="3810000"/>
+          </a:xfrm>
+        </p:spPr>
+      </p:pic>
+      <p:sp>
+        <p:nvSpPr>
+          <p:cNvPr id="7" name="Content Placeholder 2"/>
+          <p:cNvSpPr>
+            <a:spLocks noGrp="1"/>
+          </p:cNvSpPr>
+          <p:nvPr>
+            <p:ph sz="quarter" idx="1"/>
+          </p:nvPr>
+        </p:nvSpPr>
+        <p:spPr>
+          <a:xfrm>
+            <a:off x="4876800" y="1676400"/>
+            <a:ext cx="3581400" cy="4419600"/>
+          </a:xfrm>
+        </p:spPr>
+        <p:txBody>
+          <a:bodyPr/>
+          <a:lstStyle/>
+          <a:p>
+            <a:r>
+              <a:rPr lang="en-US" dirty="0"/>
+              <a:t>This graph is multiple values for each bar.</a:t>
+            </a:r>
+          </a:p>
+          <a:p>
+            <a:r>
+              <a:rPr lang="en-US" dirty="0"/>
+              <a:t>3 dimensional bars</a:t>
+            </a:r>
+          </a:p>
+        </p:txBody>
+      </p:sp>
     </p:spTree>
+    <p:extLst>
+      <p:ext uri="{BB962C8B-B14F-4D97-AF65-F5344CB8AC3E}">
+        <p14:creationId xmlns:p14="http://schemas.microsoft.com/office/powerpoint/2010/main" val="4058641916"/>
+      </p:ext>
+    </p:extLst>
   </p:cSld>
   <p:clrMapOvr>
     <a:masterClrMapping/>
   </p:clrMapOvr>
-  <mc:AlternateContent xmlns:mc="http://schemas.openxmlformats.org/markup-compatibility/2006">
-    <mc:Choice xmlns:p14="http://schemas.microsoft.com/office/powerpoint/2010/main" Requires="p14">
-      <p:transition spd="slow" p14:dur="2000" advTm="15000"/>
-    </mc:Choice>
-    <mc:Fallback>
-      <p:transition spd="slow" advTm="15000"/>
-    </mc:Fallback>
-  </mc:AlternateContent>
 </p:sld>
 </file>
 
@@ -6037,29 +5522,91 @@
           <a:bodyPr/>
           <a:lstStyle/>
           <a:p>
-            <a:endParaRPr lang="en-US"/>
-          </a:p>
-        </p:txBody>
-      </p:sp>
-      <p:sp>
-        <p:nvSpPr>
-          <p:cNvPr id="3" name="Content Placeholder 2"/>
-          <p:cNvSpPr>
-            <a:spLocks noGrp="1"/>
-          </p:cNvSpPr>
+            <a:r>
+              <a:rPr lang="en-US" dirty="0"/>
+              <a:t>  D3 - Examples</a:t>
+            </a:r>
+          </a:p>
+        </p:txBody>
+      </p:sp>
+      <p:pic>
+        <p:nvPicPr>
+          <p:cNvPr id="4" name="Content Placeholder 3"/>
+          <p:cNvPicPr>
+            <a:picLocks noGrp="1" noChangeAspect="1"/>
+          </p:cNvPicPr>
           <p:nvPr>
             <p:ph sz="quarter" idx="1"/>
           </p:nvPr>
+        </p:nvPicPr>
+        <p:blipFill>
+          <a:blip r:embed="rId2">
+            <a:extLst>
+              <a:ext uri="{28A0092B-C50C-407E-A947-70E740481C1C}">
+                <a14:useLocalDpi xmlns:a14="http://schemas.microsoft.com/office/drawing/2010/main" val="0"/>
+              </a:ext>
+            </a:extLst>
+          </a:blip>
+          <a:stretch>
+            <a:fillRect/>
+          </a:stretch>
+        </p:blipFill>
+        <p:spPr>
+          <a:xfrm>
+            <a:off x="609600" y="1961541"/>
+            <a:ext cx="3886200" cy="3827094"/>
+          </a:xfrm>
+        </p:spPr>
+      </p:pic>
+      <p:sp>
+        <p:nvSpPr>
+          <p:cNvPr id="8" name="Content Placeholder 7"/>
+          <p:cNvSpPr>
+            <a:spLocks noGrp="1"/>
+          </p:cNvSpPr>
+          <p:nvPr>
+            <p:ph sz="quarter" idx="2"/>
+          </p:nvPr>
         </p:nvSpPr>
         <p:spPr/>
         <p:txBody>
           <a:bodyPr/>
           <a:lstStyle/>
           <a:p>
-            <a:endParaRPr lang="en-US"/>
-          </a:p>
-        </p:txBody>
-      </p:sp>
+            <a:r>
+              <a:rPr lang="en-US" dirty="0"/>
+              <a:t>This graph show data on multiple axes</a:t>
+            </a:r>
+          </a:p>
+          <a:p>
+            <a:endParaRPr lang="en-US" dirty="0"/>
+          </a:p>
+        </p:txBody>
+      </p:sp>
+      <p:pic>
+        <p:nvPicPr>
+          <p:cNvPr id="7" name="Picture 6"/>
+          <p:cNvPicPr>
+            <a:picLocks noChangeAspect="1"/>
+          </p:cNvPicPr>
+          <p:nvPr/>
+        </p:nvPicPr>
+        <p:blipFill>
+          <a:blip r:embed="rId3"/>
+          <a:stretch>
+            <a:fillRect/>
+          </a:stretch>
+        </p:blipFill>
+        <p:spPr>
+          <a:xfrm>
+            <a:off x="566859" y="1768549"/>
+            <a:ext cx="3084929" cy="4419600"/>
+          </a:xfrm>
+          <a:prstGeom prst="rect">
+            <a:avLst/>
+          </a:prstGeom>
+        </p:spPr>
+      </p:pic>
     </p:spTree>
     <p:extLst>
       <p:ext uri="{BB962C8B-B14F-4D97-AF65-F5344CB8AC3E}">
@@ -6070,11 +5617,11 @@
   <p:clrMapOvr>
     <a:masterClrMapping/>
   </p:clrMapOvr>
-  <mc:AlternateContent xmlns:mc="http://schemas.openxmlformats.org/markup-compatibility/2006">
-    <mc:Choice xmlns:p14="http://schemas.microsoft.com/office/powerpoint/2010/main" Requires="p14">
+  <mc:AlternateContent xmlns:mc="http://schemas.openxmlformats.org/markup-compatibility/2006" xmlns:p14="http://schemas.microsoft.com/office/powerpoint/2010/main">
+    <mc:Choice Requires="p14">
       <p:transition spd="slow" p14:dur="2000" advTm="15000"/>
     </mc:Choice>
-    <mc:Fallback>
+    <mc:Fallback xmlns="">
       <p:transition spd="slow" advTm="15000"/>
     </mc:Fallback>
   </mc:AlternateContent>
@@ -6115,41 +5662,77 @@
           <a:p>
             <a:r>
               <a:rPr lang="en-US" dirty="0"/>
-              <a:t>Graphs/Charts 2</a:t>
-            </a:r>
-          </a:p>
-        </p:txBody>
-      </p:sp>
-      <p:graphicFrame>
-        <p:nvGraphicFramePr>
-          <p:cNvPr id="4" name="Content Placeholder 3"/>
-          <p:cNvGraphicFramePr>
-            <a:graphicFrameLocks noGrp="1"/>
-          </p:cNvGraphicFramePr>
+              <a:t>  D3 - Examples</a:t>
+            </a:r>
+          </a:p>
+        </p:txBody>
+      </p:sp>
+      <p:pic>
+        <p:nvPicPr>
+          <p:cNvPr id="7" name="Content Placeholder 6"/>
+          <p:cNvPicPr>
+            <a:picLocks noGrp="1" noChangeAspect="1"/>
+          </p:cNvPicPr>
           <p:nvPr>
             <p:ph sz="quarter" idx="1"/>
           </p:nvPr>
-        </p:nvGraphicFramePr>
-        <p:xfrm>
-          <a:off x="612775" y="1600200"/>
-          <a:ext cx="8153400" cy="4495800"/>
-        </p:xfrm>
-        <a:graphic>
-          <a:graphicData uri="http://schemas.openxmlformats.org/drawingml/2006/chart">
-            <c:chart xmlns:c="http://schemas.openxmlformats.org/drawingml/2006/chart" xmlns:r="http://schemas.openxmlformats.org/officeDocument/2006/relationships" r:id="rId3"/>
-          </a:graphicData>
-        </a:graphic>
-      </p:graphicFrame>
+        </p:nvPicPr>
+        <p:blipFill>
+          <a:blip r:embed="rId3">
+            <a:extLst>
+              <a:ext uri="{28A0092B-C50C-407E-A947-70E740481C1C}">
+                <a14:useLocalDpi xmlns:a14="http://schemas.microsoft.com/office/drawing/2010/main" val="0"/>
+              </a:ext>
+            </a:extLst>
+          </a:blip>
+          <a:stretch>
+            <a:fillRect/>
+          </a:stretch>
+        </p:blipFill>
+        <p:spPr>
+          <a:xfrm>
+            <a:off x="609600" y="1752600"/>
+            <a:ext cx="7924800" cy="2049863"/>
+          </a:xfrm>
+        </p:spPr>
+      </p:pic>
+      <p:sp>
+        <p:nvSpPr>
+          <p:cNvPr id="6" name="Content Placeholder 5"/>
+          <p:cNvSpPr>
+            <a:spLocks noGrp="1"/>
+          </p:cNvSpPr>
+          <p:nvPr>
+            <p:ph sz="quarter" idx="2"/>
+          </p:nvPr>
+        </p:nvSpPr>
+        <p:spPr>
+          <a:xfrm>
+            <a:off x="685800" y="3962399"/>
+            <a:ext cx="8045301" cy="2199167"/>
+          </a:xfrm>
+        </p:spPr>
+        <p:txBody>
+          <a:bodyPr/>
+          <a:lstStyle/>
+          <a:p>
+            <a:r>
+              <a:rPr lang="en-US" dirty="0"/>
+              <a:t>This graph shows Grand Prix race car drivers vs how many times they have won and what make of care they were driving.</a:t>
+            </a:r>
+          </a:p>
+        </p:txBody>
+      </p:sp>
     </p:spTree>
   </p:cSld>
   <p:clrMapOvr>
     <a:masterClrMapping/>
   </p:clrMapOvr>
-  <mc:AlternateContent xmlns:mc="http://schemas.openxmlformats.org/markup-compatibility/2006">
-    <mc:Choice xmlns:p14="http://schemas.microsoft.com/office/powerpoint/2010/main" Requires="p14">
+  <mc:AlternateContent xmlns:mc="http://schemas.openxmlformats.org/markup-compatibility/2006" xmlns:p14="http://schemas.microsoft.com/office/powerpoint/2010/main">
+    <mc:Choice Requires="p14">
       <p:transition spd="slow" p14:dur="2000" advTm="15000"/>
     </mc:Choice>
-    <mc:Fallback>
+    <mc:Fallback xmlns="">
       <p:transition spd="slow" advTm="15000"/>
     </mc:Fallback>
   </mc:AlternateContent>
@@ -6188,7 +5771,10 @@
           <a:bodyPr/>
           <a:lstStyle/>
           <a:p>
-            <a:endParaRPr lang="en-US"/>
+            <a:r>
+              <a:rPr lang="en-US" dirty="0"/>
+              <a:t>  D3 GitHub</a:t>
+            </a:r>
           </a:p>
         </p:txBody>
       </p:sp>
@@ -6207,7 +5793,22 @@
           <a:bodyPr/>
           <a:lstStyle/>
           <a:p>
-            <a:endParaRPr lang="en-US"/>
+            <a:r>
+              <a:rPr lang="en-US" dirty="0"/>
+              <a:t>D3 source code is stored in a public GitHub repository</a:t>
+            </a:r>
+          </a:p>
+          <a:p>
+            <a:r>
+              <a:rPr lang="en-US" dirty="0"/>
+              <a:t>Documentation for each of the D3 libraries</a:t>
+            </a:r>
+          </a:p>
+          <a:p>
+            <a:r>
+              <a:rPr lang="en-US" dirty="0"/>
+              <a:t>GitHub contains thousands of code example for this library.</a:t>
+            </a:r>
           </a:p>
         </p:txBody>
       </p:sp>
@@ -6221,11 +5822,11 @@
   <p:clrMapOvr>
     <a:masterClrMapping/>
   </p:clrMapOvr>
-  <mc:AlternateContent xmlns:mc="http://schemas.openxmlformats.org/markup-compatibility/2006">
-    <mc:Choice xmlns:p14="http://schemas.microsoft.com/office/powerpoint/2010/main" Requires="p14">
+  <mc:AlternateContent xmlns:mc="http://schemas.openxmlformats.org/markup-compatibility/2006" xmlns:p14="http://schemas.microsoft.com/office/powerpoint/2010/main">
+    <mc:Choice Requires="p14">
       <p:transition spd="slow" p14:dur="2000" advTm="15000"/>
     </mc:Choice>
-    <mc:Fallback>
+    <mc:Fallback xmlns="">
       <p:transition spd="slow" advTm="15000"/>
     </mc:Fallback>
   </mc:AlternateContent>
@@ -6264,7 +5865,10 @@
           <a:bodyPr/>
           <a:lstStyle/>
           <a:p>
-            <a:endParaRPr lang="en-US"/>
+            <a:r>
+              <a:rPr lang="en-US" dirty="0"/>
+              <a:t>  D3 Coding Example</a:t>
+            </a:r>
           </a:p>
         </p:txBody>
       </p:sp>
@@ -6283,25 +5887,79 @@
           <a:bodyPr/>
           <a:lstStyle/>
           <a:p>
-            <a:endParaRPr lang="en-US"/>
+            <a:r>
+              <a:rPr lang="en-US" dirty="0"/>
+              <a:t># Selections</a:t>
+            </a:r>
+          </a:p>
+          <a:p>
+            <a:pPr lvl="1"/>
+            <a:r>
+              <a:rPr lang="en-US" dirty="0"/>
+              <a:t>You can use selectors just the same as your </a:t>
+            </a:r>
+            <a:r>
+              <a:rPr lang="en-US" dirty="0" err="1"/>
+              <a:t>Jquery</a:t>
+            </a:r>
+            <a:r>
+              <a:rPr lang="en-US" dirty="0"/>
+              <a:t> code</a:t>
+            </a:r>
+          </a:p>
+          <a:p>
+            <a:pPr lvl="2"/>
+            <a:r>
+              <a:rPr lang="en-US" dirty="0" err="1"/>
+              <a:t>g.selectAll</a:t>
+            </a:r>
+            <a:r>
+              <a:rPr lang="en-US" dirty="0"/>
+              <a:t>(".bar")</a:t>
+            </a:r>
+          </a:p>
+          <a:p>
+            <a:pPr lvl="3"/>
+            <a:r>
+              <a:rPr lang="en-US" dirty="0"/>
+              <a:t>This line of code selects all of the bars that  are being graphed.</a:t>
+            </a:r>
+          </a:p>
+          <a:p>
+            <a:pPr lvl="3"/>
+            <a:endParaRPr lang="en-US" dirty="0"/>
+          </a:p>
+          <a:p>
+            <a:pPr lvl="1"/>
+            <a:r>
+              <a:rPr lang="en-US" dirty="0"/>
+              <a:t>D3 provides numerous methods for setting attributes or styles</a:t>
+            </a:r>
+          </a:p>
+          <a:p>
+            <a:pPr lvl="1"/>
+            <a:r>
+              <a:rPr lang="en-US" dirty="0"/>
+              <a:t>Direct access to the DOM is also possible, as each D3 selection is simply an array of nodes.</a:t>
+            </a:r>
           </a:p>
         </p:txBody>
       </p:sp>
     </p:spTree>
     <p:extLst>
       <p:ext uri="{BB962C8B-B14F-4D97-AF65-F5344CB8AC3E}">
-        <p14:creationId xmlns:p14="http://schemas.microsoft.com/office/powerpoint/2010/main" val="2096424946"/>
+        <p14:creationId xmlns:p14="http://schemas.microsoft.com/office/powerpoint/2010/main" val="2598709547"/>
       </p:ext>
     </p:extLst>
   </p:cSld>
   <p:clrMapOvr>
     <a:masterClrMapping/>
   </p:clrMapOvr>
-  <mc:AlternateContent xmlns:mc="http://schemas.openxmlformats.org/markup-compatibility/2006">
-    <mc:Choice xmlns:p14="http://schemas.microsoft.com/office/powerpoint/2010/main" Requires="p14">
+  <mc:AlternateContent xmlns:mc="http://schemas.openxmlformats.org/markup-compatibility/2006" xmlns:p14="http://schemas.microsoft.com/office/powerpoint/2010/main">
+    <mc:Choice Requires="p14">
       <p:transition spd="slow" p14:dur="2000" advTm="15000"/>
     </mc:Choice>
-    <mc:Fallback>
+    <mc:Fallback xmlns="">
       <p:transition spd="slow" advTm="15000"/>
     </mc:Fallback>
   </mc:AlternateContent>
@@ -6327,7 +5985,7 @@
       </p:grpSpPr>
       <p:sp>
         <p:nvSpPr>
-          <p:cNvPr id="2" name="Rectangle 1"/>
+          <p:cNvPr id="2" name="Title 1"/>
           <p:cNvSpPr>
             <a:spLocks noGrp="1"/>
           </p:cNvSpPr>
@@ -6342,14 +6000,14 @@
           <a:p>
             <a:r>
               <a:rPr lang="en-US" dirty="0"/>
-              <a:t>Conclusion</a:t>
-            </a:r>
-          </a:p>
-        </p:txBody>
-      </p:sp>
-      <p:sp>
-        <p:nvSpPr>
-          <p:cNvPr id="3" name="Rectangle 2"/>
+              <a:t>  D3 Coding Example</a:t>
+            </a:r>
+          </a:p>
+        </p:txBody>
+      </p:sp>
+      <p:sp>
+        <p:nvSpPr>
+          <p:cNvPr id="3" name="Content Placeholder 2"/>
           <p:cNvSpPr>
             <a:spLocks noGrp="1"/>
           </p:cNvSpPr>
@@ -6357,35 +6015,105 @@
             <p:ph sz="quarter" idx="1"/>
           </p:nvPr>
         </p:nvSpPr>
-        <p:spPr/>
-        <p:txBody>
-          <a:bodyPr/>
-          <a:lstStyle/>
-          <a:p>
-            <a:pPr>
-              <a:buFont typeface="Wingdings" pitchFamily="2" charset="2"/>
-              <a:buChar char="Ø"/>
+        <p:spPr>
+          <a:xfrm>
+            <a:off x="612648" y="1600200"/>
+            <a:ext cx="8153400" cy="4724400"/>
+          </a:xfrm>
+        </p:spPr>
+        <p:txBody>
+          <a:bodyPr>
+            <a:normAutofit lnSpcReduction="10000"/>
+          </a:bodyPr>
+          <a:lstStyle/>
+          <a:p>
+            <a:r>
+              <a:rPr lang="en-US" dirty="0"/>
+              <a:t>D3 has dynamic properties</a:t>
+            </a:r>
+          </a:p>
+          <a:p>
+            <a:pPr lvl="1"/>
+            <a:r>
+              <a:rPr lang="en-US" dirty="0"/>
+              <a:t>Styles, attributes, and other properties can be specified as functions of data in D3</a:t>
+            </a:r>
+          </a:p>
+          <a:p>
+            <a:r>
+              <a:rPr lang="en-US" dirty="0"/>
+              <a:t>D3 has many built-in reusable functions and function factories, such as graphical primitives for area, line, and pie charts</a:t>
+            </a:r>
+          </a:p>
+          <a:p>
+            <a:r>
+              <a:rPr lang="en-US" dirty="0"/>
+              <a:t>To alternate shade of grey for even and odd nodes</a:t>
+            </a:r>
+          </a:p>
+          <a:p>
+            <a:pPr marL="0" indent="0">
+              <a:buNone/>
             </a:pPr>
             <a:r>
               <a:rPr lang="en-US" dirty="0"/>
-              <a:t>Add your conclusions here.</a:t>
+              <a:t>	d3.selectAll(“p”).style(“color”, function(</a:t>
+            </a:r>
+            <a:r>
+              <a:rPr lang="en-US" dirty="0" err="1"/>
+              <a:t>d,i</a:t>
+            </a:r>
+            <a:r>
+              <a:rPr lang="en-US" dirty="0"/>
+              <a:t>) {</a:t>
+            </a:r>
+          </a:p>
+          <a:p>
+            <a:pPr marL="0" indent="0">
+              <a:buNone/>
+            </a:pPr>
+            <a:r>
+              <a:rPr lang="en-US" dirty="0"/>
+              <a:t>	 return I % 2 ? “#</a:t>
+            </a:r>
+            <a:r>
+              <a:rPr lang="en-US" dirty="0" err="1"/>
+              <a:t>fff</a:t>
+            </a:r>
+            <a:r>
+              <a:rPr lang="en-US" dirty="0"/>
+              <a:t>” : “#</a:t>
+            </a:r>
+            <a:r>
+              <a:rPr lang="en-US" dirty="0" err="1"/>
+              <a:t>eee</a:t>
+            </a:r>
+            <a:r>
+              <a:rPr lang="en-US" dirty="0"/>
+              <a:t>”;</a:t>
+            </a:r>
+          </a:p>
+          <a:p>
+            <a:pPr marL="0" indent="0">
+              <a:buNone/>
+            </a:pPr>
+            <a:r>
+              <a:rPr lang="en-US" dirty="0"/>
+              <a:t>} );</a:t>
             </a:r>
           </a:p>
         </p:txBody>
       </p:sp>
     </p:spTree>
+    <p:extLst>
+      <p:ext uri="{BB962C8B-B14F-4D97-AF65-F5344CB8AC3E}">
+        <p14:creationId xmlns:p14="http://schemas.microsoft.com/office/powerpoint/2010/main" val="624025142"/>
+      </p:ext>
+    </p:extLst>
   </p:cSld>
   <p:clrMapOvr>
     <a:masterClrMapping/>
   </p:clrMapOvr>
-  <mc:AlternateContent xmlns:mc="http://schemas.openxmlformats.org/markup-compatibility/2006">
-    <mc:Choice xmlns:p14="http://schemas.microsoft.com/office/powerpoint/2010/main" Requires="p14">
-      <p:transition spd="slow" p14:dur="2000" advTm="15000"/>
-    </mc:Choice>
-    <mc:Fallback>
-      <p:transition spd="slow" advTm="15000"/>
-    </mc:Fallback>
-  </mc:AlternateContent>
 </p:sld>
 </file>
 
@@ -6421,13 +6149,16 @@
           <a:bodyPr/>
           <a:lstStyle/>
           <a:p>
-            <a:endParaRPr lang="en-US"/>
-          </a:p>
-        </p:txBody>
-      </p:sp>
-      <p:sp>
-        <p:nvSpPr>
-          <p:cNvPr id="3" name="Content Placeholder 2"/>
+            <a:r>
+              <a:rPr lang="en-US" dirty="0"/>
+              <a:t>  D3 Coding Example</a:t>
+            </a:r>
+          </a:p>
+        </p:txBody>
+      </p:sp>
+      <p:sp>
+        <p:nvSpPr>
+          <p:cNvPr id="5" name="Content Placeholder 4"/>
           <p:cNvSpPr>
             <a:spLocks noGrp="1"/>
           </p:cNvSpPr>
@@ -6440,25 +6171,100 @@
           <a:bodyPr/>
           <a:lstStyle/>
           <a:p>
-            <a:endParaRPr lang="en-US"/>
+            <a:r>
+              <a:rPr lang="en-US" dirty="0">
+                <a:solidFill>
+                  <a:srgbClr val="FF0000"/>
+                </a:solidFill>
+              </a:rPr>
+              <a:t>Enter and Exit</a:t>
+            </a:r>
+          </a:p>
+          <a:p>
+            <a:pPr lvl="1"/>
+            <a:r>
+              <a:rPr lang="en-US" dirty="0">
+                <a:solidFill>
+                  <a:srgbClr val="FF0000"/>
+                </a:solidFill>
+              </a:rPr>
+              <a:t>Using D3’s enter and exit functions, you can create new nodes for incoming data and remove outgoing nodes that are no longer needed.</a:t>
+            </a:r>
+          </a:p>
+          <a:p>
+            <a:pPr lvl="1"/>
+            <a:r>
+              <a:rPr lang="en-US" dirty="0">
+                <a:solidFill>
+                  <a:srgbClr val="FF0000"/>
+                </a:solidFill>
+              </a:rPr>
+              <a:t>A common pattern is to break the initial selection into three parts.	</a:t>
+            </a:r>
+          </a:p>
+          <a:p>
+            <a:pPr lvl="2"/>
+            <a:r>
+              <a:rPr lang="en-US" dirty="0">
+                <a:solidFill>
+                  <a:srgbClr val="FF0000"/>
+                </a:solidFill>
+              </a:rPr>
+              <a:t>Updating nodes to modify</a:t>
+            </a:r>
+          </a:p>
+          <a:p>
+            <a:pPr lvl="2"/>
+            <a:r>
+              <a:rPr lang="en-US" dirty="0">
+                <a:solidFill>
+                  <a:srgbClr val="FF0000"/>
+                </a:solidFill>
+              </a:rPr>
+              <a:t>Entering nodes to add</a:t>
+            </a:r>
+          </a:p>
+          <a:p>
+            <a:pPr lvl="2"/>
+            <a:r>
+              <a:rPr lang="en-US" dirty="0">
+                <a:solidFill>
+                  <a:srgbClr val="FF0000"/>
+                </a:solidFill>
+              </a:rPr>
+              <a:t>Exiting nodes </a:t>
+            </a:r>
+            <a:r>
+              <a:rPr lang="en-US">
+                <a:solidFill>
+                  <a:srgbClr val="FF0000"/>
+                </a:solidFill>
+              </a:rPr>
+              <a:t>to remove</a:t>
+            </a:r>
+            <a:endParaRPr lang="en-US" dirty="0">
+              <a:solidFill>
+                <a:srgbClr val="FF0000"/>
+              </a:solidFill>
+            </a:endParaRPr>
           </a:p>
         </p:txBody>
       </p:sp>
     </p:spTree>
     <p:extLst>
       <p:ext uri="{BB962C8B-B14F-4D97-AF65-F5344CB8AC3E}">
-        <p14:creationId xmlns:p14="http://schemas.microsoft.com/office/powerpoint/2010/main" val="2598709547"/>
+        <p14:creationId xmlns:p14="http://schemas.microsoft.com/office/powerpoint/2010/main" val="3790782235"/>
       </p:ext>
     </p:extLst>
   </p:cSld>
   <p:clrMapOvr>
     <a:masterClrMapping/>
   </p:clrMapOvr>
-  <mc:AlternateContent xmlns:mc="http://schemas.openxmlformats.org/markup-compatibility/2006">
-    <mc:Choice xmlns:p14="http://schemas.microsoft.com/office/powerpoint/2010/main" Requires="p14">
+  <mc:AlternateContent xmlns:mc="http://schemas.openxmlformats.org/markup-compatibility/2006" xmlns:p14="http://schemas.microsoft.com/office/powerpoint/2010/main">
+    <mc:Choice Requires="p14">
       <p:transition spd="slow" p14:dur="2000" advTm="15000"/>
     </mc:Choice>
-    <mc:Fallback>
+    <mc:Fallback xmlns="">
       <p:transition spd="slow" advTm="15000"/>
     </mc:Fallback>
   </mc:AlternateContent>
@@ -6484,7 +6290,7 @@
       </p:grpSpPr>
       <p:sp>
         <p:nvSpPr>
-          <p:cNvPr id="2" name="Title 1"/>
+          <p:cNvPr id="2" name="Rectangle 1"/>
           <p:cNvSpPr>
             <a:spLocks noGrp="1"/>
           </p:cNvSpPr>
@@ -6497,13 +6303,16 @@
           <a:bodyPr/>
           <a:lstStyle/>
           <a:p>
-            <a:endParaRPr lang="en-US"/>
-          </a:p>
-        </p:txBody>
-      </p:sp>
-      <p:sp>
-        <p:nvSpPr>
-          <p:cNvPr id="3" name="Content Placeholder 2"/>
+            <a:r>
+              <a:rPr lang="en-US" dirty="0"/>
+              <a:t>Conclusion</a:t>
+            </a:r>
+          </a:p>
+        </p:txBody>
+      </p:sp>
+      <p:sp>
+        <p:nvSpPr>
+          <p:cNvPr id="3" name="Rectangle 2"/>
           <p:cNvSpPr>
             <a:spLocks noGrp="1"/>
           </p:cNvSpPr>
@@ -6516,25 +6325,57 @@
           <a:bodyPr/>
           <a:lstStyle/>
           <a:p>
-            <a:endParaRPr lang="en-US"/>
+            <a:pPr>
+              <a:buFont typeface="Wingdings" pitchFamily="2" charset="2"/>
+              <a:buChar char="Ø"/>
+            </a:pPr>
+            <a:r>
+              <a:rPr lang="en-US" dirty="0"/>
+              <a:t>D3 is a very powerful graphing library </a:t>
+            </a:r>
+          </a:p>
+          <a:p>
+            <a:pPr>
+              <a:buFont typeface="Wingdings" pitchFamily="2" charset="2"/>
+              <a:buChar char="Ø"/>
+            </a:pPr>
+            <a:r>
+              <a:rPr lang="en-US" dirty="0"/>
+              <a:t>The programmer has an infinite number of choices on how to visualize data.</a:t>
+            </a:r>
+          </a:p>
+          <a:p>
+            <a:pPr>
+              <a:buFont typeface="Wingdings" pitchFamily="2" charset="2"/>
+              <a:buChar char="Ø"/>
+            </a:pPr>
+            <a:r>
+              <a:rPr lang="en-US" dirty="0"/>
+              <a:t>Allow lots of time for learning</a:t>
+            </a:r>
+          </a:p>
+          <a:p>
+            <a:pPr>
+              <a:buFont typeface="Wingdings" pitchFamily="2" charset="2"/>
+              <a:buChar char="Ø"/>
+            </a:pPr>
+            <a:r>
+              <a:rPr lang="en-US" dirty="0"/>
+              <a:t>Allow lots of time for thinking</a:t>
+            </a:r>
           </a:p>
         </p:txBody>
       </p:sp>
     </p:spTree>
-    <p:extLst>
-      <p:ext uri="{BB962C8B-B14F-4D97-AF65-F5344CB8AC3E}">
-        <p14:creationId xmlns:p14="http://schemas.microsoft.com/office/powerpoint/2010/main" val="3790782235"/>
-      </p:ext>
-    </p:extLst>
   </p:cSld>
   <p:clrMapOvr>
     <a:masterClrMapping/>
   </p:clrMapOvr>
-  <mc:AlternateContent xmlns:mc="http://schemas.openxmlformats.org/markup-compatibility/2006">
-    <mc:Choice xmlns:p14="http://schemas.microsoft.com/office/powerpoint/2010/main" Requires="p14">
+  <mc:AlternateContent xmlns:mc="http://schemas.openxmlformats.org/markup-compatibility/2006" xmlns:p14="http://schemas.microsoft.com/office/powerpoint/2010/main">
+    <mc:Choice Requires="p14">
       <p:transition spd="slow" p14:dur="2000" advTm="15000"/>
     </mc:Choice>
-    <mc:Fallback>
+    <mc:Fallback xmlns="">
       <p:transition spd="slow" advTm="15000"/>
     </mc:Fallback>
   </mc:AlternateContent>
@@ -6575,7 +6416,7 @@
           <a:p>
             <a:r>
               <a:rPr lang="en-US" dirty="0"/>
-              <a:t>Information</a:t>
+              <a:t> D3 </a:t>
             </a:r>
           </a:p>
         </p:txBody>
@@ -6593,7 +6434,7 @@
         <p:spPr>
           <a:xfrm>
             <a:off x="609600" y="1752600"/>
-            <a:ext cx="3886200" cy="4572000"/>
+            <a:ext cx="7772400" cy="4572000"/>
           </a:xfrm>
           <a:ln w="19050" cmpd="dbl">
             <a:solidFill>
@@ -6613,9 +6454,35 @@
               <a:buFont typeface="Wingdings" pitchFamily="2" charset="2"/>
               <a:buChar char="Ø"/>
             </a:pPr>
-            <a:r>
-              <a:rPr lang="en-US" dirty="0"/>
-              <a:t>Class</a:t>
+            <a:endParaRPr lang="en-US" u="sng" dirty="0"/>
+          </a:p>
+          <a:p>
+            <a:pPr marL="0" indent="0">
+              <a:buNone/>
+            </a:pPr>
+            <a:r>
+              <a:rPr lang="en-US" u="sng" dirty="0"/>
+              <a:t>D</a:t>
+            </a:r>
+            <a:r>
+              <a:rPr lang="en-US" dirty="0"/>
+              <a:t>ata </a:t>
+            </a:r>
+            <a:r>
+              <a:rPr lang="en-US" u="sng" dirty="0"/>
+              <a:t>D</a:t>
+            </a:r>
+            <a:r>
+              <a:rPr lang="en-US" dirty="0"/>
+              <a:t>rive </a:t>
+            </a:r>
+            <a:r>
+              <a:rPr lang="en-US" u="sng" dirty="0"/>
+              <a:t>D</a:t>
+            </a:r>
+            <a:r>
+              <a:rPr lang="en-US" dirty="0"/>
+              <a:t>ocuments</a:t>
             </a:r>
           </a:p>
           <a:p>
@@ -6625,17 +6492,7 @@
             </a:pPr>
             <a:r>
               <a:rPr lang="en-US" dirty="0"/>
-              <a:t>Location</a:t>
-            </a:r>
-          </a:p>
-          <a:p>
-            <a:pPr>
-              <a:buFont typeface="Wingdings" pitchFamily="2" charset="2"/>
-              <a:buChar char="Ø"/>
-            </a:pPr>
-            <a:r>
-              <a:rPr lang="en-US" dirty="0"/>
-              <a:t>Schedule</a:t>
+              <a:t>Makes possible	</a:t>
             </a:r>
           </a:p>
           <a:p>
@@ -6645,7 +6502,7 @@
             </a:pPr>
             <a:r>
               <a:rPr lang="en-US" dirty="0"/>
-              <a:t>M-W-F</a:t>
+              <a:t>Bind arbitrary data to a Document Object Model</a:t>
             </a:r>
           </a:p>
           <a:p>
@@ -6655,84 +6512,7 @@
             </a:pPr>
             <a:r>
               <a:rPr lang="en-US" dirty="0"/>
-              <a:t>Lab Tues-Thurs</a:t>
-            </a:r>
-          </a:p>
-          <a:p>
-            <a:pPr>
-              <a:buFont typeface="Wingdings" pitchFamily="2" charset="2"/>
-              <a:buChar char="Ø"/>
-            </a:pPr>
-            <a:r>
-              <a:rPr lang="en-US" dirty="0"/>
-              <a:t>Office</a:t>
-            </a:r>
-          </a:p>
-          <a:p>
-            <a:pPr>
-              <a:buFont typeface="Wingdings" pitchFamily="2" charset="2"/>
-              <a:buChar char="Ø"/>
-            </a:pPr>
-            <a:r>
-              <a:rPr lang="en-US" dirty="0"/>
-              <a:t>Phone</a:t>
-            </a:r>
-          </a:p>
-          <a:p>
-            <a:pPr>
-              <a:buFont typeface="Wingdings" pitchFamily="2" charset="2"/>
-              <a:buChar char="Ø"/>
-            </a:pPr>
-            <a:r>
-              <a:rPr lang="en-US" dirty="0"/>
-              <a:t>Email</a:t>
-            </a:r>
-          </a:p>
-          <a:p>
-            <a:pPr>
-              <a:buFont typeface="Wingdings" pitchFamily="2" charset="2"/>
-              <a:buChar char="Ø"/>
-            </a:pPr>
-            <a:endParaRPr lang="en-US" dirty="0"/>
-          </a:p>
-        </p:txBody>
-      </p:sp>
-      <p:sp>
-        <p:nvSpPr>
-          <p:cNvPr id="9" name="Content Placeholder 8"/>
-          <p:cNvSpPr>
-            <a:spLocks noGrp="1"/>
-          </p:cNvSpPr>
-          <p:nvPr>
-            <p:ph sz="quarter" idx="2"/>
-          </p:nvPr>
-        </p:nvSpPr>
-        <p:spPr>
-          <a:xfrm>
-            <a:off x="4844901" y="1752600"/>
-            <a:ext cx="3886200" cy="4572000"/>
-          </a:xfrm>
-          <a:ln w="12700" cmpd="dbl">
-            <a:solidFill>
-              <a:schemeClr val="accent2">
-                <a:lumMod val="75000"/>
-              </a:schemeClr>
-            </a:solidFill>
-          </a:ln>
-        </p:spPr>
-        <p:txBody>
-          <a:bodyPr>
-            <a:normAutofit/>
-          </a:bodyPr>
-          <a:lstStyle/>
-          <a:p>
-            <a:pPr>
-              <a:buFont typeface="Wingdings" pitchFamily="2" charset="2"/>
-              <a:buChar char="Ø"/>
-            </a:pPr>
-            <a:r>
-              <a:rPr lang="en-US" dirty="0"/>
-              <a:t>Book(s)</a:t>
+              <a:t>Apply data driven transformations to the document</a:t>
             </a:r>
           </a:p>
           <a:p>
@@ -6742,61 +6522,8 @@
             </a:pPr>
             <a:r>
               <a:rPr lang="en-US" dirty="0"/>
-              <a:t>Required Text</a:t>
-            </a:r>
-          </a:p>
-          <a:p>
-            <a:pPr lvl="1">
-              <a:buFont typeface="Wingdings" pitchFamily="2" charset="2"/>
-              <a:buChar char="Ø"/>
-            </a:pPr>
-            <a:r>
-              <a:rPr lang="en-US" dirty="0"/>
-              <a:t>Additional</a:t>
-            </a:r>
-          </a:p>
-          <a:p>
-            <a:pPr>
-              <a:buFont typeface="Wingdings" pitchFamily="2" charset="2"/>
-              <a:buChar char="Ø"/>
-            </a:pPr>
-            <a:r>
-              <a:rPr lang="en-US" dirty="0"/>
-              <a:t>Materials</a:t>
-            </a:r>
-          </a:p>
-          <a:p>
-            <a:pPr lvl="1">
-              <a:buFont typeface="Wingdings" pitchFamily="2" charset="2"/>
-              <a:buChar char="Ø"/>
-            </a:pPr>
-            <a:r>
-              <a:rPr lang="en-US" dirty="0"/>
-              <a:t>Item 1</a:t>
-            </a:r>
-          </a:p>
-          <a:p>
-            <a:pPr lvl="1">
-              <a:buFont typeface="Wingdings" pitchFamily="2" charset="2"/>
-              <a:buChar char="Ø"/>
-            </a:pPr>
-            <a:r>
-              <a:rPr lang="en-US" dirty="0"/>
-              <a:t>Item 2</a:t>
-            </a:r>
-          </a:p>
-          <a:p>
-            <a:pPr lvl="1">
-              <a:buFont typeface="Wingdings" pitchFamily="2" charset="2"/>
-              <a:buChar char="Ø"/>
-            </a:pPr>
-            <a:r>
-              <a:rPr lang="en-US" dirty="0"/>
-              <a:t>Item 3</a:t>
-            </a:r>
-          </a:p>
-          <a:p>
-            <a:endParaRPr lang="en-US" dirty="0"/>
+              <a:t>Use the same data to create an interactive chart</a:t>
+            </a:r>
           </a:p>
         </p:txBody>
       </p:sp>
@@ -6805,11 +6532,11 @@
   <p:clrMapOvr>
     <a:masterClrMapping/>
   </p:clrMapOvr>
-  <mc:AlternateContent xmlns:mc="http://schemas.openxmlformats.org/markup-compatibility/2006">
-    <mc:Choice xmlns:p14="http://schemas.microsoft.com/office/powerpoint/2010/main" Requires="p14">
+  <mc:AlternateContent xmlns:mc="http://schemas.openxmlformats.org/markup-compatibility/2006" xmlns:p14="http://schemas.microsoft.com/office/powerpoint/2010/main">
+    <mc:Choice Requires="p14">
       <p:transition spd="slow" p14:dur="2000" advTm="15000"/>
     </mc:Choice>
-    <mc:Fallback>
+    <mc:Fallback xmlns="">
       <p:transition spd="slow" advTm="15000"/>
     </mc:Fallback>
   </mc:AlternateContent>
@@ -6886,7 +6613,7 @@
             </a:pPr>
             <a:r>
               <a:rPr lang="en-US" dirty="0"/>
-              <a:t>Discussion</a:t>
+              <a:t>Yes, there are many available examples</a:t>
             </a:r>
           </a:p>
           <a:p>
@@ -6895,8 +6622,12 @@
               <a:buChar char="Ø"/>
             </a:pPr>
             <a:r>
-              <a:rPr lang="en-US" dirty="0"/>
-              <a:t>Discussion</a:t>
+              <a:rPr lang="en-US" dirty="0" err="1"/>
+              <a:t>Youtube</a:t>
+            </a:r>
+            <a:r>
+              <a:rPr lang="en-US" dirty="0"/>
+              <a:t> videos are also available</a:t>
             </a:r>
           </a:p>
           <a:p>
@@ -6916,7 +6647,7 @@
             </a:pPr>
             <a:r>
               <a:rPr lang="en-US" dirty="0"/>
-              <a:t>Discussion</a:t>
+              <a:t>Yes</a:t>
             </a:r>
           </a:p>
           <a:p>
@@ -6944,7 +6675,17 @@
             </a:pPr>
             <a:r>
               <a:rPr lang="en-US" dirty="0"/>
-              <a:t>Discussion</a:t>
+              <a:t>There is a steep learning curve</a:t>
+            </a:r>
+          </a:p>
+          <a:p>
+            <a:pPr lvl="1">
+              <a:buFont typeface="Wingdings" pitchFamily="2" charset="2"/>
+              <a:buChar char="Ø"/>
+            </a:pPr>
+            <a:r>
+              <a:rPr lang="en-US" dirty="0"/>
+              <a:t>You can’t mix version 3 examples with version 4 libraries.</a:t>
             </a:r>
           </a:p>
         </p:txBody>
@@ -6954,11 +6695,11 @@
   <p:clrMapOvr>
     <a:masterClrMapping/>
   </p:clrMapOvr>
-  <mc:AlternateContent xmlns:mc="http://schemas.openxmlformats.org/markup-compatibility/2006">
-    <mc:Choice xmlns:p14="http://schemas.microsoft.com/office/powerpoint/2010/main" Requires="p14">
+  <mc:AlternateContent xmlns:mc="http://schemas.openxmlformats.org/markup-compatibility/2006" xmlns:p14="http://schemas.microsoft.com/office/powerpoint/2010/main">
+    <mc:Choice Requires="p14">
       <p:transition spd="slow" p14:dur="2000" advTm="15000"/>
     </mc:Choice>
-    <mc:Fallback>
+    <mc:Fallback xmlns="">
       <p:transition spd="slow" advTm="15000"/>
     </mc:Fallback>
   </mc:AlternateContent>
@@ -6997,7 +6738,10 @@
           <a:bodyPr/>
           <a:lstStyle/>
           <a:p>
-            <a:endParaRPr lang="en-US"/>
+            <a:r>
+              <a:rPr lang="en-US" dirty="0"/>
+              <a:t>  D3 Advantages</a:t>
+            </a:r>
           </a:p>
         </p:txBody>
       </p:sp>
@@ -7011,31 +6755,36 @@
             <p:ph sz="quarter" idx="1"/>
           </p:nvPr>
         </p:nvSpPr>
-        <p:spPr/>
+        <p:spPr>
+          <a:xfrm>
+            <a:off x="838200" y="2362199"/>
+            <a:ext cx="7315200" cy="3799367"/>
+          </a:xfrm>
+        </p:spPr>
         <p:txBody>
           <a:bodyPr/>
           <a:lstStyle/>
           <a:p>
-            <a:endParaRPr lang="en-US"/>
-          </a:p>
-        </p:txBody>
-      </p:sp>
-      <p:sp>
-        <p:nvSpPr>
-          <p:cNvPr id="4" name="Content Placeholder 3"/>
-          <p:cNvSpPr>
-            <a:spLocks noGrp="1"/>
-          </p:cNvSpPr>
-          <p:nvPr>
-            <p:ph sz="quarter" idx="2"/>
-          </p:nvPr>
-        </p:nvSpPr>
-        <p:spPr/>
-        <p:txBody>
-          <a:bodyPr/>
-          <a:lstStyle/>
-          <a:p>
-            <a:endParaRPr lang="en-US"/>
+            <a:r>
+              <a:rPr lang="en-US" dirty="0" err="1"/>
+              <a:t>Efficent</a:t>
+            </a:r>
+            <a:r>
+              <a:rPr lang="en-US" dirty="0"/>
+              <a:t> manipulation of documents based on data</a:t>
+            </a:r>
+          </a:p>
+          <a:p>
+            <a:r>
+              <a:rPr lang="en-US" dirty="0"/>
+              <a:t>Exposes full capabilities of web standards such as HTML,SVG, CSS.</a:t>
+            </a:r>
+          </a:p>
+          <a:p>
+            <a:r>
+              <a:rPr lang="en-US" dirty="0"/>
+              <a:t>Supports large datasets</a:t>
+            </a:r>
           </a:p>
         </p:txBody>
       </p:sp>
@@ -7049,11 +6798,11 @@
   <p:clrMapOvr>
     <a:masterClrMapping/>
   </p:clrMapOvr>
-  <mc:AlternateContent xmlns:mc="http://schemas.openxmlformats.org/markup-compatibility/2006">
-    <mc:Choice xmlns:p14="http://schemas.microsoft.com/office/powerpoint/2010/main" Requires="p14">
+  <mc:AlternateContent xmlns:mc="http://schemas.openxmlformats.org/markup-compatibility/2006" xmlns:p14="http://schemas.microsoft.com/office/powerpoint/2010/main">
+    <mc:Choice Requires="p14">
       <p:transition spd="slow" p14:dur="2000" advTm="15000"/>
     </mc:Choice>
-    <mc:Fallback>
+    <mc:Fallback xmlns="">
       <p:transition spd="slow" advTm="15000"/>
     </mc:Fallback>
   </mc:AlternateContent>
@@ -7094,582 +6843,111 @@
           <a:p>
             <a:r>
               <a:rPr lang="en-US" dirty="0"/>
-              <a:t>Schedule</a:t>
-            </a:r>
-          </a:p>
-        </p:txBody>
-      </p:sp>
-      <p:graphicFrame>
-        <p:nvGraphicFramePr>
-          <p:cNvPr id="4" name="Content Placeholder 3"/>
-          <p:cNvGraphicFramePr>
-            <a:graphicFrameLocks noGrp="1"/>
-          </p:cNvGraphicFramePr>
+              <a:t>  D3 Components and Plugins</a:t>
+            </a:r>
+          </a:p>
+        </p:txBody>
+      </p:sp>
+      <p:sp>
+        <p:nvSpPr>
+          <p:cNvPr id="3" name="Content Placeholder 2"/>
+          <p:cNvSpPr>
+            <a:spLocks noGrp="1"/>
+          </p:cNvSpPr>
           <p:nvPr>
             <p:ph sz="quarter" idx="1"/>
           </p:nvPr>
-        </p:nvGraphicFramePr>
-        <p:xfrm>
-          <a:off x="612775" y="1600200"/>
-          <a:ext cx="8153404" cy="3337560"/>
-        </p:xfrm>
-        <a:graphic>
-          <a:graphicData uri="http://schemas.openxmlformats.org/drawingml/2006/table">
-            <a:tbl>
-              <a:tblPr firstRow="1" bandRow="1">
-                <a:tableStyleId>{0660B408-B3CF-4A94-85FC-2B1E0A45F4A2}</a:tableStyleId>
-              </a:tblPr>
-              <a:tblGrid>
-                <a:gridCol w="2038351">
-                  <a:extLst>
-                    <a:ext uri="{9D8B030D-6E8A-4147-A177-3AD203B41FA5}">
-                      <a16:colId xmlns:a16="http://schemas.microsoft.com/office/drawing/2014/main" val="20000"/>
-                    </a:ext>
-                  </a:extLst>
-                </a:gridCol>
-                <a:gridCol w="2038351">
-                  <a:extLst>
-                    <a:ext uri="{9D8B030D-6E8A-4147-A177-3AD203B41FA5}">
-                      <a16:colId xmlns:a16="http://schemas.microsoft.com/office/drawing/2014/main" val="20001"/>
-                    </a:ext>
-                  </a:extLst>
-                </a:gridCol>
-                <a:gridCol w="2038351">
-                  <a:extLst>
-                    <a:ext uri="{9D8B030D-6E8A-4147-A177-3AD203B41FA5}">
-                      <a16:colId xmlns:a16="http://schemas.microsoft.com/office/drawing/2014/main" val="20002"/>
-                    </a:ext>
-                  </a:extLst>
-                </a:gridCol>
-                <a:gridCol w="2038351">
-                  <a:extLst>
-                    <a:ext uri="{9D8B030D-6E8A-4147-A177-3AD203B41FA5}">
-                      <a16:colId xmlns:a16="http://schemas.microsoft.com/office/drawing/2014/main" val="20003"/>
-                    </a:ext>
-                  </a:extLst>
-                </a:gridCol>
-              </a:tblGrid>
-              <a:tr h="370840">
-                <a:tc>
-                  <a:txBody>
-                    <a:bodyPr/>
-                    <a:lstStyle/>
-                    <a:p>
-                      <a:pPr algn="ctr"/>
-                      <a:r>
-                        <a:rPr lang="en-US" sz="1400" dirty="0"/>
-                        <a:t>Class/Week</a:t>
-                      </a:r>
-                    </a:p>
-                  </a:txBody>
-                  <a:tcPr marL="95923" marR="95923"/>
-                </a:tc>
-                <a:tc>
-                  <a:txBody>
-                    <a:bodyPr/>
-                    <a:lstStyle/>
-                    <a:p>
-                      <a:pPr algn="ctr"/>
-                      <a:r>
-                        <a:rPr lang="en-US" sz="1400" dirty="0"/>
-                        <a:t>Topic</a:t>
-                      </a:r>
-                    </a:p>
-                  </a:txBody>
-                  <a:tcPr marL="95923" marR="95923"/>
-                </a:tc>
-                <a:tc>
-                  <a:txBody>
-                    <a:bodyPr/>
-                    <a:lstStyle/>
-                    <a:p>
-                      <a:pPr algn="ctr"/>
-                      <a:r>
-                        <a:rPr lang="en-US" sz="1400" dirty="0"/>
-                        <a:t>Reading</a:t>
-                      </a:r>
-                    </a:p>
-                  </a:txBody>
-                  <a:tcPr marL="95923" marR="95923"/>
-                </a:tc>
-                <a:tc>
-                  <a:txBody>
-                    <a:bodyPr/>
-                    <a:lstStyle/>
-                    <a:p>
-                      <a:pPr algn="ctr"/>
-                      <a:r>
-                        <a:rPr lang="en-US" sz="1400" dirty="0"/>
-                        <a:t>Assignment </a:t>
-                      </a:r>
-                    </a:p>
-                  </a:txBody>
-                  <a:tcPr marL="95923" marR="95923"/>
-                </a:tc>
-                <a:extLst>
-                  <a:ext uri="{0D108BD9-81ED-4DB2-BD59-A6C34878D82A}">
-                    <a16:rowId xmlns:a16="http://schemas.microsoft.com/office/drawing/2014/main" val="10000"/>
-                  </a:ext>
-                </a:extLst>
-              </a:tr>
-              <a:tr h="370840">
-                <a:tc>
-                  <a:txBody>
-                    <a:bodyPr/>
-                    <a:lstStyle/>
-                    <a:p>
-                      <a:pPr algn="ctr"/>
-                      <a:r>
-                        <a:rPr lang="en-US" sz="1400" dirty="0"/>
-                        <a:t>1</a:t>
-                      </a:r>
-                    </a:p>
-                  </a:txBody>
-                  <a:tcPr marL="95923" marR="95923"/>
-                </a:tc>
-                <a:tc>
-                  <a:txBody>
-                    <a:bodyPr/>
-                    <a:lstStyle/>
-                    <a:p>
-                      <a:pPr algn="ctr"/>
-                      <a:r>
-                        <a:rPr lang="en-US" sz="1400" dirty="0"/>
-                        <a:t>Topic </a:t>
-                      </a:r>
-                    </a:p>
-                  </a:txBody>
-                  <a:tcPr marL="95923" marR="95923"/>
-                </a:tc>
-                <a:tc>
-                  <a:txBody>
-                    <a:bodyPr/>
-                    <a:lstStyle/>
-                    <a:p>
-                      <a:pPr algn="ctr"/>
-                      <a:r>
-                        <a:rPr lang="en-US" sz="1400" dirty="0"/>
-                        <a:t>Chapter</a:t>
-                      </a:r>
-                    </a:p>
-                  </a:txBody>
-                  <a:tcPr marL="95923" marR="95923"/>
-                </a:tc>
-                <a:tc>
-                  <a:txBody>
-                    <a:bodyPr/>
-                    <a:lstStyle/>
-                    <a:p>
-                      <a:pPr algn="ctr"/>
-                      <a:r>
-                        <a:rPr lang="en-US" sz="1400" dirty="0"/>
-                        <a:t>Task</a:t>
-                      </a:r>
-                    </a:p>
-                  </a:txBody>
-                  <a:tcPr marL="95923" marR="95923"/>
-                </a:tc>
-                <a:extLst>
-                  <a:ext uri="{0D108BD9-81ED-4DB2-BD59-A6C34878D82A}">
-                    <a16:rowId xmlns:a16="http://schemas.microsoft.com/office/drawing/2014/main" val="10001"/>
-                  </a:ext>
-                </a:extLst>
-              </a:tr>
-              <a:tr h="370840">
-                <a:tc>
-                  <a:txBody>
-                    <a:bodyPr/>
-                    <a:lstStyle/>
-                    <a:p>
-                      <a:pPr algn="ctr"/>
-                      <a:r>
-                        <a:rPr lang="en-US" sz="1400" dirty="0"/>
-                        <a:t>2</a:t>
-                      </a:r>
-                    </a:p>
-                  </a:txBody>
-                  <a:tcPr marL="95923" marR="95923"/>
-                </a:tc>
-                <a:tc>
-                  <a:txBody>
-                    <a:bodyPr/>
-                    <a:lstStyle/>
-                    <a:p>
-                      <a:pPr algn="ctr"/>
-                      <a:r>
-                        <a:rPr lang="en-US" sz="1400" dirty="0"/>
-                        <a:t>Topic </a:t>
-                      </a:r>
-                    </a:p>
-                  </a:txBody>
-                  <a:tcPr marL="95923" marR="95923"/>
-                </a:tc>
-                <a:tc>
-                  <a:txBody>
-                    <a:bodyPr/>
-                    <a:lstStyle/>
-                    <a:p>
-                      <a:pPr algn="ctr"/>
-                      <a:r>
-                        <a:rPr lang="en-US" sz="1400" dirty="0"/>
-                        <a:t>Chapter</a:t>
-                      </a:r>
-                    </a:p>
-                  </a:txBody>
-                  <a:tcPr marL="95923" marR="95923"/>
-                </a:tc>
-                <a:tc>
-                  <a:txBody>
-                    <a:bodyPr/>
-                    <a:lstStyle/>
-                    <a:p>
-                      <a:pPr algn="ctr"/>
-                      <a:r>
-                        <a:rPr lang="en-US" sz="1400" dirty="0"/>
-                        <a:t>Task</a:t>
-                      </a:r>
-                    </a:p>
-                  </a:txBody>
-                  <a:tcPr marL="95923" marR="95923"/>
-                </a:tc>
-                <a:extLst>
-                  <a:ext uri="{0D108BD9-81ED-4DB2-BD59-A6C34878D82A}">
-                    <a16:rowId xmlns:a16="http://schemas.microsoft.com/office/drawing/2014/main" val="10002"/>
-                  </a:ext>
-                </a:extLst>
-              </a:tr>
-              <a:tr h="370840">
-                <a:tc>
-                  <a:txBody>
-                    <a:bodyPr/>
-                    <a:lstStyle/>
-                    <a:p>
-                      <a:pPr algn="ctr"/>
-                      <a:r>
-                        <a:rPr lang="en-US" sz="1400" dirty="0"/>
-                        <a:t>3</a:t>
-                      </a:r>
-                    </a:p>
-                  </a:txBody>
-                  <a:tcPr marL="95923" marR="95923"/>
-                </a:tc>
-                <a:tc>
-                  <a:txBody>
-                    <a:bodyPr/>
-                    <a:lstStyle/>
-                    <a:p>
-                      <a:pPr algn="ctr"/>
-                      <a:r>
-                        <a:rPr lang="en-US" sz="1400" dirty="0"/>
-                        <a:t>Topic </a:t>
-                      </a:r>
-                    </a:p>
-                  </a:txBody>
-                  <a:tcPr marL="95923" marR="95923"/>
-                </a:tc>
-                <a:tc>
-                  <a:txBody>
-                    <a:bodyPr/>
-                    <a:lstStyle/>
-                    <a:p>
-                      <a:pPr algn="ctr"/>
-                      <a:r>
-                        <a:rPr lang="en-US" sz="1400" dirty="0"/>
-                        <a:t>Chapter</a:t>
-                      </a:r>
-                    </a:p>
-                  </a:txBody>
-                  <a:tcPr marL="95923" marR="95923"/>
-                </a:tc>
-                <a:tc>
-                  <a:txBody>
-                    <a:bodyPr/>
-                    <a:lstStyle/>
-                    <a:p>
-                      <a:pPr algn="ctr"/>
-                      <a:r>
-                        <a:rPr lang="en-US" sz="1400" dirty="0"/>
-                        <a:t>Task</a:t>
-                      </a:r>
-                    </a:p>
-                  </a:txBody>
-                  <a:tcPr marL="95923" marR="95923"/>
-                </a:tc>
-                <a:extLst>
-                  <a:ext uri="{0D108BD9-81ED-4DB2-BD59-A6C34878D82A}">
-                    <a16:rowId xmlns:a16="http://schemas.microsoft.com/office/drawing/2014/main" val="10003"/>
-                  </a:ext>
-                </a:extLst>
-              </a:tr>
-              <a:tr h="370840">
-                <a:tc>
-                  <a:txBody>
-                    <a:bodyPr/>
-                    <a:lstStyle/>
-                    <a:p>
-                      <a:pPr algn="ctr"/>
-                      <a:endParaRPr lang="en-US" sz="1400" dirty="0"/>
-                    </a:p>
-                  </a:txBody>
-                  <a:tcPr marL="95923" marR="95923"/>
-                </a:tc>
-                <a:tc>
-                  <a:txBody>
-                    <a:bodyPr/>
-                    <a:lstStyle/>
-                    <a:p>
-                      <a:pPr algn="ctr"/>
-                      <a:endParaRPr lang="en-US" sz="1400" dirty="0"/>
-                    </a:p>
-                  </a:txBody>
-                  <a:tcPr marL="95923" marR="95923"/>
-                </a:tc>
-                <a:tc>
-                  <a:txBody>
-                    <a:bodyPr/>
-                    <a:lstStyle/>
-                    <a:p>
-                      <a:pPr algn="ctr"/>
-                      <a:endParaRPr lang="en-US" sz="1400" dirty="0"/>
-                    </a:p>
-                  </a:txBody>
-                  <a:tcPr marL="95923" marR="95923"/>
-                </a:tc>
-                <a:tc>
-                  <a:txBody>
-                    <a:bodyPr/>
-                    <a:lstStyle/>
-                    <a:p>
-                      <a:pPr algn="ctr"/>
-                      <a:endParaRPr lang="en-US" sz="1400" dirty="0"/>
-                    </a:p>
-                  </a:txBody>
-                  <a:tcPr marL="95923" marR="95923"/>
-                </a:tc>
-                <a:extLst>
-                  <a:ext uri="{0D108BD9-81ED-4DB2-BD59-A6C34878D82A}">
-                    <a16:rowId xmlns:a16="http://schemas.microsoft.com/office/drawing/2014/main" val="10004"/>
-                  </a:ext>
-                </a:extLst>
-              </a:tr>
-              <a:tr h="370840">
-                <a:tc>
-                  <a:txBody>
-                    <a:bodyPr/>
-                    <a:lstStyle/>
-                    <a:p>
-                      <a:pPr algn="ctr"/>
-                      <a:endParaRPr lang="en-US" sz="1400" dirty="0"/>
-                    </a:p>
-                  </a:txBody>
-                  <a:tcPr marL="95923" marR="95923"/>
-                </a:tc>
-                <a:tc>
-                  <a:txBody>
-                    <a:bodyPr/>
-                    <a:lstStyle/>
-                    <a:p>
-                      <a:pPr algn="ctr"/>
-                      <a:endParaRPr lang="en-US" sz="1400" dirty="0"/>
-                    </a:p>
-                  </a:txBody>
-                  <a:tcPr marL="95923" marR="95923"/>
-                </a:tc>
-                <a:tc>
-                  <a:txBody>
-                    <a:bodyPr/>
-                    <a:lstStyle/>
-                    <a:p>
-                      <a:pPr algn="ctr"/>
-                      <a:endParaRPr lang="en-US" sz="1400" dirty="0"/>
-                    </a:p>
-                  </a:txBody>
-                  <a:tcPr marL="95923" marR="95923"/>
-                </a:tc>
-                <a:tc>
-                  <a:txBody>
-                    <a:bodyPr/>
-                    <a:lstStyle/>
-                    <a:p>
-                      <a:pPr algn="ctr"/>
-                      <a:endParaRPr lang="en-US" sz="1400" dirty="0"/>
-                    </a:p>
-                  </a:txBody>
-                  <a:tcPr marL="95923" marR="95923"/>
-                </a:tc>
-                <a:extLst>
-                  <a:ext uri="{0D108BD9-81ED-4DB2-BD59-A6C34878D82A}">
-                    <a16:rowId xmlns:a16="http://schemas.microsoft.com/office/drawing/2014/main" val="10005"/>
-                  </a:ext>
-                </a:extLst>
-              </a:tr>
-              <a:tr h="370840">
-                <a:tc>
-                  <a:txBody>
-                    <a:bodyPr/>
-                    <a:lstStyle/>
-                    <a:p>
-                      <a:pPr algn="ctr"/>
-                      <a:endParaRPr lang="en-US" sz="1400" dirty="0"/>
-                    </a:p>
-                  </a:txBody>
-                  <a:tcPr marL="95923" marR="95923"/>
-                </a:tc>
-                <a:tc>
-                  <a:txBody>
-                    <a:bodyPr/>
-                    <a:lstStyle/>
-                    <a:p>
-                      <a:pPr algn="ctr"/>
-                      <a:endParaRPr lang="en-US" sz="1400" dirty="0"/>
-                    </a:p>
-                  </a:txBody>
-                  <a:tcPr marL="95923" marR="95923"/>
-                </a:tc>
-                <a:tc>
-                  <a:txBody>
-                    <a:bodyPr/>
-                    <a:lstStyle/>
-                    <a:p>
-                      <a:pPr algn="ctr"/>
-                      <a:endParaRPr lang="en-US" sz="1400" dirty="0"/>
-                    </a:p>
-                  </a:txBody>
-                  <a:tcPr marL="95923" marR="95923"/>
-                </a:tc>
-                <a:tc>
-                  <a:txBody>
-                    <a:bodyPr/>
-                    <a:lstStyle/>
-                    <a:p>
-                      <a:pPr algn="ctr"/>
-                      <a:endParaRPr lang="en-US" sz="1400" dirty="0"/>
-                    </a:p>
-                  </a:txBody>
-                  <a:tcPr marL="95923" marR="95923"/>
-                </a:tc>
-                <a:extLst>
-                  <a:ext uri="{0D108BD9-81ED-4DB2-BD59-A6C34878D82A}">
-                    <a16:rowId xmlns:a16="http://schemas.microsoft.com/office/drawing/2014/main" val="10006"/>
-                  </a:ext>
-                </a:extLst>
-              </a:tr>
-              <a:tr h="370840">
-                <a:tc>
-                  <a:txBody>
-                    <a:bodyPr/>
-                    <a:lstStyle/>
-                    <a:p>
-                      <a:pPr algn="ctr"/>
-                      <a:endParaRPr lang="en-US" sz="1400" dirty="0"/>
-                    </a:p>
-                  </a:txBody>
-                  <a:tcPr marL="95923" marR="95923"/>
-                </a:tc>
-                <a:tc>
-                  <a:txBody>
-                    <a:bodyPr/>
-                    <a:lstStyle/>
-                    <a:p>
-                      <a:pPr algn="ctr"/>
-                      <a:endParaRPr lang="en-US" sz="1400" dirty="0"/>
-                    </a:p>
-                  </a:txBody>
-                  <a:tcPr marL="95923" marR="95923"/>
-                </a:tc>
-                <a:tc>
-                  <a:txBody>
-                    <a:bodyPr/>
-                    <a:lstStyle/>
-                    <a:p>
-                      <a:pPr algn="ctr"/>
-                      <a:endParaRPr lang="en-US" sz="1400" dirty="0"/>
-                    </a:p>
-                  </a:txBody>
-                  <a:tcPr marL="95923" marR="95923"/>
-                </a:tc>
-                <a:tc>
-                  <a:txBody>
-                    <a:bodyPr/>
-                    <a:lstStyle/>
-                    <a:p>
-                      <a:pPr algn="ctr"/>
-                      <a:endParaRPr lang="en-US" sz="1400" dirty="0"/>
-                    </a:p>
-                  </a:txBody>
-                  <a:tcPr marL="95923" marR="95923"/>
-                </a:tc>
-                <a:extLst>
-                  <a:ext uri="{0D108BD9-81ED-4DB2-BD59-A6C34878D82A}">
-                    <a16:rowId xmlns:a16="http://schemas.microsoft.com/office/drawing/2014/main" val="10007"/>
-                  </a:ext>
-                </a:extLst>
-              </a:tr>
-              <a:tr h="370840">
-                <a:tc>
-                  <a:txBody>
-                    <a:bodyPr/>
-                    <a:lstStyle/>
-                    <a:p>
-                      <a:pPr algn="ctr"/>
-                      <a:endParaRPr lang="en-US" sz="1400" dirty="0"/>
-                    </a:p>
-                  </a:txBody>
-                  <a:tcPr marL="95923" marR="95923"/>
-                </a:tc>
-                <a:tc>
-                  <a:txBody>
-                    <a:bodyPr/>
-                    <a:lstStyle/>
-                    <a:p>
-                      <a:pPr algn="ctr"/>
-                      <a:endParaRPr lang="en-US" sz="1400" dirty="0"/>
-                    </a:p>
-                  </a:txBody>
-                  <a:tcPr marL="95923" marR="95923"/>
-                </a:tc>
-                <a:tc>
-                  <a:txBody>
-                    <a:bodyPr/>
-                    <a:lstStyle/>
-                    <a:p>
-                      <a:pPr algn="ctr"/>
-                      <a:endParaRPr lang="en-US" sz="1400" dirty="0"/>
-                    </a:p>
-                  </a:txBody>
-                  <a:tcPr marL="95923" marR="95923"/>
-                </a:tc>
-                <a:tc>
-                  <a:txBody>
-                    <a:bodyPr/>
-                    <a:lstStyle/>
-                    <a:p>
-                      <a:pPr algn="ctr"/>
-                      <a:endParaRPr lang="en-US" sz="1400" dirty="0"/>
-                    </a:p>
-                  </a:txBody>
-                  <a:tcPr marL="95923" marR="95923"/>
-                </a:tc>
-                <a:extLst>
-                  <a:ext uri="{0D108BD9-81ED-4DB2-BD59-A6C34878D82A}">
-                    <a16:rowId xmlns:a16="http://schemas.microsoft.com/office/drawing/2014/main" val="10008"/>
-                  </a:ext>
-                </a:extLst>
-              </a:tr>
-            </a:tbl>
-          </a:graphicData>
-        </a:graphic>
-      </p:graphicFrame>
+        </p:nvSpPr>
+        <p:spPr>
+          <a:xfrm>
+            <a:off x="685800" y="2209800"/>
+            <a:ext cx="8080248" cy="3886200"/>
+          </a:xfrm>
+        </p:spPr>
+        <p:txBody>
+          <a:bodyPr/>
+          <a:lstStyle/>
+          <a:p>
+            <a:r>
+              <a:rPr lang="en-US" dirty="0">
+                <a:hlinkClick r:id="rId3"/>
+              </a:rPr>
+              <a:t>d3/d3-geo-projection</a:t>
+            </a:r>
+            <a:r>
+              <a:rPr lang="en-US" dirty="0"/>
+              <a:t> - extended geographic projections.</a:t>
+            </a:r>
+          </a:p>
+          <a:p>
+            <a:r>
+              <a:rPr lang="en-US" dirty="0" err="1">
+                <a:hlinkClick r:id="rId4"/>
+              </a:rPr>
+              <a:t>etiennecrb</a:t>
+            </a:r>
+            <a:r>
+              <a:rPr lang="en-US" dirty="0">
+                <a:hlinkClick r:id="rId4"/>
+              </a:rPr>
+              <a:t>/d3-xyzoom</a:t>
+            </a:r>
+            <a:r>
+              <a:rPr lang="en-US" dirty="0"/>
+              <a:t> - independent zoom scaling on x and y axis.</a:t>
+            </a:r>
+          </a:p>
+          <a:p>
+            <a:r>
+              <a:rPr lang="en-US" dirty="0" err="1">
+                <a:hlinkClick r:id="rId5"/>
+              </a:rPr>
+              <a:t>susielu</a:t>
+            </a:r>
+            <a:r>
+              <a:rPr lang="en-US" dirty="0">
+                <a:hlinkClick r:id="rId5"/>
+              </a:rPr>
+              <a:t>/d3-legend</a:t>
+            </a:r>
+            <a:r>
+              <a:rPr lang="en-US" dirty="0"/>
+              <a:t> - reusable legends!</a:t>
+            </a:r>
+          </a:p>
+          <a:p>
+            <a:r>
+              <a:rPr lang="en-US" dirty="0" err="1">
+                <a:hlinkClick r:id="rId6"/>
+              </a:rPr>
+              <a:t>tomgp</a:t>
+            </a:r>
+            <a:r>
+              <a:rPr lang="en-US" dirty="0">
+                <a:hlinkClick r:id="rId6"/>
+              </a:rPr>
+              <a:t>/d3-iconarray</a:t>
+            </a:r>
+            <a:r>
+              <a:rPr lang="en-US" dirty="0"/>
+              <a:t> - draw an array of icons.</a:t>
+            </a:r>
+          </a:p>
+          <a:p>
+            <a:endParaRPr lang="en-US" dirty="0"/>
+          </a:p>
+        </p:txBody>
+      </p:sp>
     </p:spTree>
   </p:cSld>
   <p:clrMapOvr>
     <a:masterClrMapping/>
   </p:clrMapOvr>
-  <mc:AlternateContent xmlns:mc="http://schemas.openxmlformats.org/markup-compatibility/2006">
-    <mc:Choice xmlns:p14="http://schemas.microsoft.com/office/powerpoint/2010/main" Requires="p14">
+  <mc:AlternateContent xmlns:mc="http://schemas.openxmlformats.org/markup-compatibility/2006" xmlns:p14="http://schemas.microsoft.com/office/powerpoint/2010/main">
+    <mc:Choice Requires="p14">
       <p:transition spd="slow" p14:dur="2000" advTm="15000"/>
     </mc:Choice>
-    <mc:Fallback>
+    <mc:Fallback xmlns="">
       <p:transition spd="slow" advTm="15000"/>
     </mc:Fallback>
   </mc:AlternateContent>
@@ -7695,7 +6973,7 @@
       </p:grpSpPr>
       <p:sp>
         <p:nvSpPr>
-          <p:cNvPr id="2" name="Rectangle 1"/>
+          <p:cNvPr id="2" name="Title 1"/>
           <p:cNvSpPr>
             <a:spLocks noGrp="1"/>
           </p:cNvSpPr>
@@ -7710,14 +6988,14 @@
           <a:p>
             <a:r>
               <a:rPr lang="en-US" dirty="0"/>
-              <a:t>Introduction/Course Description</a:t>
-            </a:r>
-          </a:p>
-        </p:txBody>
-      </p:sp>
-      <p:sp>
-        <p:nvSpPr>
-          <p:cNvPr id="3" name="Rectangle 2"/>
+              <a:t>Back in the Day….</a:t>
+            </a:r>
+          </a:p>
+        </p:txBody>
+      </p:sp>
+      <p:sp>
+        <p:nvSpPr>
+          <p:cNvPr id="3" name="Content Placeholder 2"/>
           <p:cNvSpPr>
             <a:spLocks noGrp="1"/>
           </p:cNvSpPr>
@@ -7730,77 +7008,46 @@
           <a:bodyPr/>
           <a:lstStyle/>
           <a:p>
-            <a:pPr>
-              <a:buFont typeface="Wingdings" pitchFamily="2" charset="2"/>
-              <a:buChar char="Ø"/>
-            </a:pPr>
-            <a:r>
-              <a:rPr lang="en-US" dirty="0"/>
-              <a:t>Introduction</a:t>
-            </a:r>
-          </a:p>
-          <a:p>
-            <a:pPr lvl="1">
-              <a:buFont typeface="Wingdings" pitchFamily="2" charset="2"/>
-              <a:buChar char="Ø"/>
-            </a:pPr>
-            <a:r>
-              <a:rPr lang="en-US" dirty="0"/>
-              <a:t>Introductory notes</a:t>
-            </a:r>
-          </a:p>
-          <a:p>
-            <a:pPr lvl="1">
-              <a:buFont typeface="Wingdings" pitchFamily="2" charset="2"/>
-              <a:buChar char="Ø"/>
-            </a:pPr>
-            <a:endParaRPr lang="en-US" dirty="0"/>
-          </a:p>
-          <a:p>
-            <a:pPr lvl="1">
-              <a:buFont typeface="Wingdings" pitchFamily="2" charset="2"/>
-              <a:buChar char="Ø"/>
-            </a:pPr>
-            <a:r>
-              <a:rPr lang="en-US" dirty="0"/>
-              <a:t>Introductory notes</a:t>
-            </a:r>
-          </a:p>
-          <a:p>
-            <a:pPr lvl="1">
-              <a:buNone/>
-            </a:pPr>
-            <a:endParaRPr lang="en-US" dirty="0"/>
-          </a:p>
-          <a:p>
-            <a:pPr lvl="1">
-              <a:buFont typeface="Wingdings" pitchFamily="2" charset="2"/>
-              <a:buChar char="Ø"/>
-            </a:pPr>
-            <a:r>
-              <a:rPr lang="en-US" dirty="0"/>
-              <a:t>Introductory notes</a:t>
-            </a:r>
-          </a:p>
-          <a:p>
-            <a:pPr lvl="1">
-              <a:buFont typeface="Wingdings" pitchFamily="2" charset="2"/>
-              <a:buChar char="Ø"/>
-            </a:pPr>
-            <a:endParaRPr lang="en-US" dirty="0"/>
+            <a:r>
+              <a:rPr lang="en-US" dirty="0"/>
+              <a:t>HP-GL/2 was the best plotting language on the market</a:t>
+            </a:r>
+          </a:p>
+          <a:p>
+            <a:r>
+              <a:rPr lang="en-US" dirty="0"/>
+              <a:t>Manual is 540 pages</a:t>
+            </a:r>
+          </a:p>
+          <a:p>
+            <a:r>
+              <a:rPr lang="en-US" dirty="0"/>
+              <a:t>Used by thousands of companies to plot experimental results</a:t>
+            </a:r>
+          </a:p>
+          <a:p>
+            <a:r>
+              <a:rPr lang="en-US" dirty="0"/>
+              <a:t>In the 1980’s this was good enough</a:t>
+            </a:r>
           </a:p>
         </p:txBody>
       </p:sp>
     </p:spTree>
+    <p:extLst>
+      <p:ext uri="{BB962C8B-B14F-4D97-AF65-F5344CB8AC3E}">
+        <p14:creationId xmlns:p14="http://schemas.microsoft.com/office/powerpoint/2010/main" val="1134221541"/>
+      </p:ext>
+    </p:extLst>
   </p:cSld>
   <p:clrMapOvr>
     <a:masterClrMapping/>
   </p:clrMapOvr>
-  <mc:AlternateContent xmlns:mc="http://schemas.openxmlformats.org/markup-compatibility/2006">
-    <mc:Choice xmlns:p14="http://schemas.microsoft.com/office/powerpoint/2010/main" Requires="p14">
+  <mc:AlternateContent xmlns:mc="http://schemas.openxmlformats.org/markup-compatibility/2006" xmlns:p14="http://schemas.microsoft.com/office/powerpoint/2010/main">
+    <mc:Choice Requires="p14">
       <p:transition spd="slow" p14:dur="2000" advTm="15000"/>
     </mc:Choice>
-    <mc:Fallback>
+    <mc:Fallback xmlns="">
       <p:transition spd="slow" advTm="15000"/>
     </mc:Fallback>
   </mc:AlternateContent>
@@ -7826,7 +7073,7 @@
       </p:grpSpPr>
       <p:sp>
         <p:nvSpPr>
-          <p:cNvPr id="2" name="Title 1"/>
+          <p:cNvPr id="2" name="Rectangle 1"/>
           <p:cNvSpPr>
             <a:spLocks noGrp="1"/>
           </p:cNvSpPr>
@@ -7839,13 +7086,20 @@
           <a:bodyPr/>
           <a:lstStyle/>
           <a:p>
-            <a:endParaRPr lang="en-US"/>
-          </a:p>
-        </p:txBody>
-      </p:sp>
-      <p:sp>
-        <p:nvSpPr>
-          <p:cNvPr id="3" name="Content Placeholder 2"/>
+            <a:r>
+              <a:rPr lang="en-US" dirty="0" err="1"/>
+              <a:t>Hp</a:t>
+            </a:r>
+            <a:r>
+              <a:rPr lang="en-US" dirty="0"/>
+              <a:t> Plotters</a:t>
+            </a:r>
+          </a:p>
+        </p:txBody>
+      </p:sp>
+      <p:sp>
+        <p:nvSpPr>
+          <p:cNvPr id="3" name="Rectangle 2"/>
           <p:cNvSpPr>
             <a:spLocks noGrp="1"/>
           </p:cNvSpPr>
@@ -7858,25 +7112,60 @@
           <a:bodyPr/>
           <a:lstStyle/>
           <a:p>
-            <a:endParaRPr lang="en-US"/>
-          </a:p>
-        </p:txBody>
-      </p:sp>
+            <a:pPr marL="0" indent="0">
+              <a:buNone/>
+            </a:pPr>
+            <a:endParaRPr lang="en-US" dirty="0"/>
+          </a:p>
+          <a:p>
+            <a:pPr lvl="1">
+              <a:buFont typeface="Wingdings" pitchFamily="2" charset="2"/>
+              <a:buChar char="Ø"/>
+            </a:pPr>
+            <a:endParaRPr lang="en-US" dirty="0"/>
+          </a:p>
+        </p:txBody>
+      </p:sp>
+      <p:pic>
+        <p:nvPicPr>
+          <p:cNvPr id="4" name="Picture 3"/>
+          <p:cNvPicPr>
+            <a:picLocks noChangeAspect="1"/>
+          </p:cNvPicPr>
+          <p:nvPr/>
+        </p:nvPicPr>
+        <p:blipFill>
+          <a:blip r:embed="rId3">
+            <a:extLst>
+              <a:ext uri="{28A0092B-C50C-407E-A947-70E740481C1C}">
+                <a14:useLocalDpi xmlns:a14="http://schemas.microsoft.com/office/drawing/2010/main" val="0"/>
+              </a:ext>
+            </a:extLst>
+          </a:blip>
+          <a:stretch>
+            <a:fillRect/>
+          </a:stretch>
+        </p:blipFill>
+        <p:spPr>
+          <a:xfrm>
+            <a:off x="2404427" y="1905000"/>
+            <a:ext cx="6482397" cy="4557712"/>
+          </a:xfrm>
+          <a:prstGeom prst="rect">
+            <a:avLst/>
+          </a:prstGeom>
+        </p:spPr>
+      </p:pic>
     </p:spTree>
-    <p:extLst>
-      <p:ext uri="{BB962C8B-B14F-4D97-AF65-F5344CB8AC3E}">
-        <p14:creationId xmlns:p14="http://schemas.microsoft.com/office/powerpoint/2010/main" val="1134221541"/>
-      </p:ext>
-    </p:extLst>
   </p:cSld>
   <p:clrMapOvr>
     <a:masterClrMapping/>
   </p:clrMapOvr>
-  <mc:AlternateContent xmlns:mc="http://schemas.openxmlformats.org/markup-compatibility/2006">
-    <mc:Choice xmlns:p14="http://schemas.microsoft.com/office/powerpoint/2010/main" Requires="p14">
+  <mc:AlternateContent xmlns:mc="http://schemas.openxmlformats.org/markup-compatibility/2006" xmlns:p14="http://schemas.microsoft.com/office/powerpoint/2010/main">
+    <mc:Choice Requires="p14">
       <p:transition spd="slow" p14:dur="2000" advTm="15000"/>
     </mc:Choice>
-    <mc:Fallback>
+    <mc:Fallback xmlns="">
       <p:transition spd="slow" advTm="15000"/>
     </mc:Fallback>
   </mc:AlternateContent>
@@ -7915,29 +7204,43 @@
           <a:bodyPr/>
           <a:lstStyle/>
           <a:p>
-            <a:endParaRPr lang="en-US"/>
-          </a:p>
-        </p:txBody>
-      </p:sp>
-      <p:sp>
-        <p:nvSpPr>
-          <p:cNvPr id="3" name="Content Placeholder 2"/>
-          <p:cNvSpPr>
-            <a:spLocks noGrp="1"/>
-          </p:cNvSpPr>
-          <p:nvPr>
-            <p:ph sz="quarter" idx="1"/>
-          </p:nvPr>
-        </p:nvSpPr>
-        <p:spPr/>
-        <p:txBody>
-          <a:bodyPr/>
-          <a:lstStyle/>
-          <a:p>
-            <a:endParaRPr lang="en-US"/>
-          </a:p>
-        </p:txBody>
-      </p:sp>
+            <a:r>
+              <a:rPr lang="en-US" dirty="0"/>
+              <a:t>  IBM Personal Computers</a:t>
+            </a:r>
+          </a:p>
+        </p:txBody>
+      </p:sp>
+      <p:pic>
+        <p:nvPicPr>
+          <p:cNvPr id="4" name="Picture 3"/>
+          <p:cNvPicPr>
+            <a:picLocks noChangeAspect="1"/>
+          </p:cNvPicPr>
+          <p:nvPr/>
+        </p:nvPicPr>
+        <p:blipFill>
+          <a:blip r:embed="rId2">
+            <a:extLst>
+              <a:ext uri="{28A0092B-C50C-407E-A947-70E740481C1C}">
+                <a14:useLocalDpi xmlns:a14="http://schemas.microsoft.com/office/drawing/2010/main" val="0"/>
+              </a:ext>
+            </a:extLst>
+          </a:blip>
+          <a:stretch>
+            <a:fillRect/>
+          </a:stretch>
+        </p:blipFill>
+        <p:spPr>
+          <a:xfrm>
+            <a:off x="2599070" y="1752600"/>
+            <a:ext cx="6121400" cy="4820603"/>
+          </a:xfrm>
+          <a:prstGeom prst="rect">
+            <a:avLst/>
+          </a:prstGeom>
+        </p:spPr>
+      </p:pic>
     </p:spTree>
     <p:extLst>
       <p:ext uri="{BB962C8B-B14F-4D97-AF65-F5344CB8AC3E}">
@@ -7948,11 +7251,11 @@
   <p:clrMapOvr>
     <a:masterClrMapping/>
   </p:clrMapOvr>
-  <mc:AlternateContent xmlns:mc="http://schemas.openxmlformats.org/markup-compatibility/2006">
-    <mc:Choice xmlns:p14="http://schemas.microsoft.com/office/powerpoint/2010/main" Requires="p14">
+  <mc:AlternateContent xmlns:mc="http://schemas.openxmlformats.org/markup-compatibility/2006" xmlns:p14="http://schemas.microsoft.com/office/powerpoint/2010/main">
+    <mc:Choice Requires="p14">
       <p:transition spd="slow" p14:dur="2000" advTm="15000"/>
     </mc:Choice>
-    <mc:Fallback>
+    <mc:Fallback xmlns="">
       <p:transition spd="slow" advTm="15000"/>
     </mc:Fallback>
   </mc:AlternateContent>
@@ -7995,7 +7298,7 @@
           <a:p>
             <a:r>
               <a:rPr lang="en-US" dirty="0"/>
-              <a:t>Objectives and Results</a:t>
+              <a:t>D3 Sample Project</a:t>
             </a:r>
           </a:p>
         </p:txBody>
@@ -8028,37 +7331,15 @@
             </a:pPr>
             <a:r>
               <a:rPr lang="en-US" dirty="0"/>
-              <a:t>Objectives</a:t>
-            </a:r>
-          </a:p>
-          <a:p>
-            <a:pPr lvl="1">
-              <a:buFont typeface="Wingdings" pitchFamily="2" charset="2"/>
-              <a:buChar char="Ø"/>
-            </a:pPr>
-            <a:r>
-              <a:rPr lang="en-US" dirty="0"/>
-              <a:t>Course objective 1</a:t>
-            </a:r>
-          </a:p>
-          <a:p>
-            <a:pPr lvl="1">
-              <a:buFont typeface="Wingdings" pitchFamily="2" charset="2"/>
-              <a:buChar char="Ø"/>
-            </a:pPr>
-            <a:r>
-              <a:rPr lang="en-US" dirty="0"/>
-              <a:t>Course objective 2</a:t>
-            </a:r>
-          </a:p>
-          <a:p>
-            <a:pPr lvl="1">
-              <a:buFont typeface="Wingdings" pitchFamily="2" charset="2"/>
-              <a:buChar char="Ø"/>
-            </a:pPr>
-            <a:r>
-              <a:rPr lang="en-US" dirty="0"/>
-              <a:t>Course objective 3</a:t>
+              <a:t>Boss at work wants to know who is selling the most tablets.  He wants it displayed in a graph.  There are eight </a:t>
+            </a:r>
+            <a:r>
+              <a:rPr lang="en-US" dirty="0" err="1"/>
+              <a:t>salesreps</a:t>
+            </a:r>
+            <a:r>
+              <a:rPr lang="en-US" dirty="0"/>
+              <a:t>.  All of the data for each rep should be displayed in the same graph.</a:t>
             </a:r>
           </a:p>
           <a:p>
@@ -8066,20 +7347,7 @@
               <a:buFont typeface="Wingdings" pitchFamily="2" charset="2"/>
               <a:buChar char="Ø"/>
             </a:pPr>
-            <a:r>
-              <a:rPr lang="en-US" dirty="0"/>
-              <a:t>Results</a:t>
-            </a:r>
-          </a:p>
-          <a:p>
-            <a:pPr lvl="1">
-              <a:buFont typeface="Wingdings" pitchFamily="2" charset="2"/>
-              <a:buChar char="Ø"/>
-            </a:pPr>
-            <a:r>
-              <a:rPr lang="en-US" dirty="0"/>
-              <a:t>Expected results</a:t>
-            </a:r>
+            <a:endParaRPr lang="en-US" dirty="0"/>
           </a:p>
           <a:p>
             <a:pPr>
@@ -8088,27 +7356,15 @@
             </a:pPr>
             <a:r>
               <a:rPr lang="en-US" dirty="0"/>
-              <a:t>Skills developed</a:t>
-            </a:r>
-          </a:p>
-          <a:p>
-            <a:pPr lvl="1">
-              <a:buFont typeface="Wingdings" pitchFamily="2" charset="2"/>
-              <a:buChar char="Ø"/>
-            </a:pPr>
-            <a:r>
-              <a:rPr lang="en-US" dirty="0"/>
-              <a:t>Skill 1</a:t>
-            </a:r>
-          </a:p>
-          <a:p>
-            <a:pPr lvl="1">
-              <a:buFont typeface="Wingdings" pitchFamily="2" charset="2"/>
-              <a:buChar char="Ø"/>
-            </a:pPr>
-            <a:r>
-              <a:rPr lang="en-US" dirty="0"/>
-              <a:t>Skill 2</a:t>
+              <a:t>Use the new D3 </a:t>
+            </a:r>
+            <a:r>
+              <a:rPr lang="en-US" dirty="0" err="1"/>
+              <a:t>Jquery</a:t>
+            </a:r>
+            <a:r>
+              <a:rPr lang="en-US" dirty="0"/>
+              <a:t> library to produce the graph.  You should be able to display the graph on a web site.</a:t>
             </a:r>
           </a:p>
           <a:p>
@@ -8125,11 +7381,11 @@
   <p:clrMapOvr>
     <a:masterClrMapping/>
   </p:clrMapOvr>
-  <mc:AlternateContent xmlns:mc="http://schemas.openxmlformats.org/markup-compatibility/2006">
-    <mc:Choice xmlns:p14="http://schemas.microsoft.com/office/powerpoint/2010/main" Requires="p14">
+  <mc:AlternateContent xmlns:mc="http://schemas.openxmlformats.org/markup-compatibility/2006" xmlns:p14="http://schemas.microsoft.com/office/powerpoint/2010/main">
+    <mc:Choice Requires="p14">
       <p:transition spd="slow" p14:dur="2000" advTm="15000"/>
     </mc:Choice>
-    <mc:Fallback>
+    <mc:Fallback xmlns="">
       <p:transition spd="slow" advTm="15000"/>
     </mc:Fallback>
   </mc:AlternateContent>
@@ -8168,7 +7424,10 @@
           <a:bodyPr/>
           <a:lstStyle/>
           <a:p>
-            <a:endParaRPr lang="en-US"/>
+            <a:r>
+              <a:rPr lang="en-US" dirty="0"/>
+              <a:t>  D3 Graphing Process Part 1</a:t>
+            </a:r>
           </a:p>
         </p:txBody>
       </p:sp>
@@ -8187,7 +7446,52 @@
           <a:bodyPr/>
           <a:lstStyle/>
           <a:p>
-            <a:endParaRPr lang="en-US"/>
+            <a:r>
+              <a:rPr lang="en-US" dirty="0"/>
+              <a:t>Create an area for the graph on the page</a:t>
+            </a:r>
+          </a:p>
+          <a:p>
+            <a:r>
+              <a:rPr lang="en-US" dirty="0"/>
+              <a:t>Scale the x and y axes</a:t>
+            </a:r>
+          </a:p>
+          <a:p>
+            <a:r>
+              <a:rPr lang="en-US" dirty="0"/>
+              <a:t>Append the graph to the DOM</a:t>
+            </a:r>
+          </a:p>
+          <a:p>
+            <a:r>
+              <a:rPr lang="en-US" dirty="0"/>
+              <a:t>Create the x axis</a:t>
+            </a:r>
+          </a:p>
+          <a:p>
+            <a:r>
+              <a:rPr lang="en-US" dirty="0"/>
+              <a:t>Create Title</a:t>
+            </a:r>
+          </a:p>
+          <a:p>
+            <a:r>
+              <a:rPr lang="en-US" dirty="0"/>
+              <a:t>Create the x axis label</a:t>
+            </a:r>
+          </a:p>
+          <a:p>
+            <a:r>
+              <a:rPr lang="en-US" dirty="0"/>
+              <a:t>Create the y axis</a:t>
+            </a:r>
+          </a:p>
+          <a:p>
+            <a:r>
+              <a:rPr lang="en-US" dirty="0"/>
+              <a:t>Create the y axis label</a:t>
+            </a:r>
           </a:p>
         </p:txBody>
       </p:sp>
@@ -8201,11 +7505,11 @@
   <p:clrMapOvr>
     <a:masterClrMapping/>
   </p:clrMapOvr>
-  <mc:AlternateContent xmlns:mc="http://schemas.openxmlformats.org/markup-compatibility/2006">
-    <mc:Choice xmlns:p14="http://schemas.microsoft.com/office/powerpoint/2010/main" Requires="p14">
+  <mc:AlternateContent xmlns:mc="http://schemas.openxmlformats.org/markup-compatibility/2006" xmlns:p14="http://schemas.microsoft.com/office/powerpoint/2010/main">
+    <mc:Choice Requires="p14">
       <p:transition spd="slow" p14:dur="2000" advTm="15000"/>
     </mc:Choice>
-    <mc:Fallback>
+    <mc:Fallback xmlns="">
       <p:transition spd="slow" advTm="15000"/>
     </mc:Fallback>
   </mc:AlternateContent>

</xml_diff>